<commit_message>
Reasonable fits to the fractional shift distributions
</commit_message>
<xml_diff>
--- a/fluctuation.pptx
+++ b/fluctuation.pptx
@@ -5,17 +5,21 @@
     <p:sldMasterId id="2147483795" r:id="rId1"/>
   </p:sldMasterIdLst>
   <p:notesMasterIdLst>
-    <p:notesMasterId r:id="rId7"/>
+    <p:notesMasterId r:id="rId11"/>
   </p:notesMasterIdLst>
   <p:handoutMasterIdLst>
-    <p:handoutMasterId r:id="rId8"/>
+    <p:handoutMasterId r:id="rId12"/>
   </p:handoutMasterIdLst>
   <p:sldIdLst>
     <p:sldId id="256" r:id="rId2"/>
     <p:sldId id="331" r:id="rId3"/>
-    <p:sldId id="342" r:id="rId4"/>
-    <p:sldId id="341" r:id="rId5"/>
-    <p:sldId id="343" r:id="rId6"/>
+    <p:sldId id="344" r:id="rId4"/>
+    <p:sldId id="342" r:id="rId5"/>
+    <p:sldId id="341" r:id="rId6"/>
+    <p:sldId id="343" r:id="rId7"/>
+    <p:sldId id="345" r:id="rId8"/>
+    <p:sldId id="346" r:id="rId9"/>
+    <p:sldId id="347" r:id="rId10"/>
   </p:sldIdLst>
   <p:sldSz cx="9144000" cy="5143500" type="screen16x9"/>
   <p:notesSz cx="6858000" cy="9144000"/>
@@ -219,7 +223,7 @@
           <a:p>
             <a:fld id="{E18E715B-C4C6-FA44-89E6-29CE8E5147AD}" type="datetimeFigureOut">
               <a:rPr lang="en-US" smtClean="0"/>
-              <a:t>6/7/19</a:t>
+              <a:t>6/14/19</a:t>
             </a:fld>
             <a:endParaRPr lang="en-US"/>
           </a:p>
@@ -396,7 +400,7 @@
           <a:p>
             <a:fld id="{C9BEE1CD-6EDF-5C43-ACE9-942F6C137C3E}" type="datetimeFigureOut">
               <a:rPr lang="en-US" smtClean="0"/>
-              <a:t>6/7/19</a:t>
+              <a:t>6/14/19</a:t>
             </a:fld>
             <a:endParaRPr lang="en-US"/>
           </a:p>
@@ -812,7 +816,7 @@
           <a:p>
             <a:fld id="{78455201-7865-8744-8A9B-9F5FC03C5C4C}" type="slidenum">
               <a:rPr lang="en-US" smtClean="0"/>
-              <a:t>3</a:t>
+              <a:t>4</a:t>
             </a:fld>
             <a:endParaRPr lang="en-US"/>
           </a:p>
@@ -896,7 +900,7 @@
           <a:p>
             <a:fld id="{78455201-7865-8744-8A9B-9F5FC03C5C4C}" type="slidenum">
               <a:rPr lang="en-US" smtClean="0"/>
-              <a:t>4</a:t>
+              <a:t>5</a:t>
             </a:fld>
             <a:endParaRPr lang="en-US"/>
           </a:p>
@@ -906,6 +910,258 @@
     <p:extLst>
       <p:ext uri="{BB962C8B-B14F-4D97-AF65-F5344CB8AC3E}">
         <p14:creationId xmlns:p14="http://schemas.microsoft.com/office/powerpoint/2010/main" val="2005983182"/>
+      </p:ext>
+    </p:extLst>
+  </p:cSld>
+  <p:clrMapOvr>
+    <a:masterClrMapping/>
+  </p:clrMapOvr>
+</p:notes>
+</file>
+
+<file path=ppt/notesSlides/notesSlide4.xml><?xml version="1.0" encoding="utf-8"?>
+<p:notes xmlns:a="http://schemas.openxmlformats.org/drawingml/2006/main" xmlns:r="http://schemas.openxmlformats.org/officeDocument/2006/relationships" xmlns:p="http://schemas.openxmlformats.org/presentationml/2006/main">
+  <p:cSld>
+    <p:spTree>
+      <p:nvGrpSpPr>
+        <p:cNvPr id="1" name=""/>
+        <p:cNvGrpSpPr/>
+        <p:nvPr/>
+      </p:nvGrpSpPr>
+      <p:grpSpPr>
+        <a:xfrm>
+          <a:off x="0" y="0"/>
+          <a:ext cx="0" cy="0"/>
+          <a:chOff x="0" y="0"/>
+          <a:chExt cx="0" cy="0"/>
+        </a:xfrm>
+      </p:grpSpPr>
+      <p:sp>
+        <p:nvSpPr>
+          <p:cNvPr id="2" name="Slide Image Placeholder 1"/>
+          <p:cNvSpPr>
+            <a:spLocks noGrp="1" noRot="1" noChangeAspect="1"/>
+          </p:cNvSpPr>
+          <p:nvPr>
+            <p:ph type="sldImg"/>
+          </p:nvPr>
+        </p:nvSpPr>
+        <p:spPr/>
+      </p:sp>
+      <p:sp>
+        <p:nvSpPr>
+          <p:cNvPr id="3" name="Notes Placeholder 2"/>
+          <p:cNvSpPr>
+            <a:spLocks noGrp="1"/>
+          </p:cNvSpPr>
+          <p:nvPr>
+            <p:ph type="body" idx="1"/>
+          </p:nvPr>
+        </p:nvSpPr>
+        <p:spPr/>
+        <p:txBody>
+          <a:bodyPr/>
+          <a:lstStyle/>
+          <a:p>
+            <a:endParaRPr lang="en-US" dirty="0"/>
+          </a:p>
+        </p:txBody>
+      </p:sp>
+      <p:sp>
+        <p:nvSpPr>
+          <p:cNvPr id="4" name="Slide Number Placeholder 3"/>
+          <p:cNvSpPr>
+            <a:spLocks noGrp="1"/>
+          </p:cNvSpPr>
+          <p:nvPr>
+            <p:ph type="sldNum" sz="quarter" idx="5"/>
+          </p:nvPr>
+        </p:nvSpPr>
+        <p:spPr/>
+        <p:txBody>
+          <a:bodyPr/>
+          <a:lstStyle/>
+          <a:p>
+            <a:fld id="{78455201-7865-8744-8A9B-9F5FC03C5C4C}" type="slidenum">
+              <a:rPr lang="en-US" smtClean="0"/>
+              <a:t>6</a:t>
+            </a:fld>
+            <a:endParaRPr lang="en-US"/>
+          </a:p>
+        </p:txBody>
+      </p:sp>
+    </p:spTree>
+    <p:extLst>
+      <p:ext uri="{BB962C8B-B14F-4D97-AF65-F5344CB8AC3E}">
+        <p14:creationId xmlns:p14="http://schemas.microsoft.com/office/powerpoint/2010/main" val="2846247479"/>
+      </p:ext>
+    </p:extLst>
+  </p:cSld>
+  <p:clrMapOvr>
+    <a:masterClrMapping/>
+  </p:clrMapOvr>
+</p:notes>
+</file>
+
+<file path=ppt/notesSlides/notesSlide5.xml><?xml version="1.0" encoding="utf-8"?>
+<p:notes xmlns:a="http://schemas.openxmlformats.org/drawingml/2006/main" xmlns:r="http://schemas.openxmlformats.org/officeDocument/2006/relationships" xmlns:p="http://schemas.openxmlformats.org/presentationml/2006/main">
+  <p:cSld>
+    <p:spTree>
+      <p:nvGrpSpPr>
+        <p:cNvPr id="1" name=""/>
+        <p:cNvGrpSpPr/>
+        <p:nvPr/>
+      </p:nvGrpSpPr>
+      <p:grpSpPr>
+        <a:xfrm>
+          <a:off x="0" y="0"/>
+          <a:ext cx="0" cy="0"/>
+          <a:chOff x="0" y="0"/>
+          <a:chExt cx="0" cy="0"/>
+        </a:xfrm>
+      </p:grpSpPr>
+      <p:sp>
+        <p:nvSpPr>
+          <p:cNvPr id="2" name="Slide Image Placeholder 1"/>
+          <p:cNvSpPr>
+            <a:spLocks noGrp="1" noRot="1" noChangeAspect="1"/>
+          </p:cNvSpPr>
+          <p:nvPr>
+            <p:ph type="sldImg"/>
+          </p:nvPr>
+        </p:nvSpPr>
+        <p:spPr/>
+      </p:sp>
+      <p:sp>
+        <p:nvSpPr>
+          <p:cNvPr id="3" name="Notes Placeholder 2"/>
+          <p:cNvSpPr>
+            <a:spLocks noGrp="1"/>
+          </p:cNvSpPr>
+          <p:nvPr>
+            <p:ph type="body" idx="1"/>
+          </p:nvPr>
+        </p:nvSpPr>
+        <p:spPr/>
+        <p:txBody>
+          <a:bodyPr/>
+          <a:lstStyle/>
+          <a:p>
+            <a:endParaRPr lang="en-US" dirty="0"/>
+          </a:p>
+        </p:txBody>
+      </p:sp>
+      <p:sp>
+        <p:nvSpPr>
+          <p:cNvPr id="4" name="Slide Number Placeholder 3"/>
+          <p:cNvSpPr>
+            <a:spLocks noGrp="1"/>
+          </p:cNvSpPr>
+          <p:nvPr>
+            <p:ph type="sldNum" sz="quarter" idx="5"/>
+          </p:nvPr>
+        </p:nvSpPr>
+        <p:spPr/>
+        <p:txBody>
+          <a:bodyPr/>
+          <a:lstStyle/>
+          <a:p>
+            <a:fld id="{78455201-7865-8744-8A9B-9F5FC03C5C4C}" type="slidenum">
+              <a:rPr lang="en-US" smtClean="0"/>
+              <a:t>7</a:t>
+            </a:fld>
+            <a:endParaRPr lang="en-US"/>
+          </a:p>
+        </p:txBody>
+      </p:sp>
+    </p:spTree>
+    <p:extLst>
+      <p:ext uri="{BB962C8B-B14F-4D97-AF65-F5344CB8AC3E}">
+        <p14:creationId xmlns:p14="http://schemas.microsoft.com/office/powerpoint/2010/main" val="501663757"/>
+      </p:ext>
+    </p:extLst>
+  </p:cSld>
+  <p:clrMapOvr>
+    <a:masterClrMapping/>
+  </p:clrMapOvr>
+</p:notes>
+</file>
+
+<file path=ppt/notesSlides/notesSlide6.xml><?xml version="1.0" encoding="utf-8"?>
+<p:notes xmlns:a="http://schemas.openxmlformats.org/drawingml/2006/main" xmlns:r="http://schemas.openxmlformats.org/officeDocument/2006/relationships" xmlns:p="http://schemas.openxmlformats.org/presentationml/2006/main">
+  <p:cSld>
+    <p:spTree>
+      <p:nvGrpSpPr>
+        <p:cNvPr id="1" name=""/>
+        <p:cNvGrpSpPr/>
+        <p:nvPr/>
+      </p:nvGrpSpPr>
+      <p:grpSpPr>
+        <a:xfrm>
+          <a:off x="0" y="0"/>
+          <a:ext cx="0" cy="0"/>
+          <a:chOff x="0" y="0"/>
+          <a:chExt cx="0" cy="0"/>
+        </a:xfrm>
+      </p:grpSpPr>
+      <p:sp>
+        <p:nvSpPr>
+          <p:cNvPr id="2" name="Slide Image Placeholder 1"/>
+          <p:cNvSpPr>
+            <a:spLocks noGrp="1" noRot="1" noChangeAspect="1"/>
+          </p:cNvSpPr>
+          <p:nvPr>
+            <p:ph type="sldImg"/>
+          </p:nvPr>
+        </p:nvSpPr>
+        <p:spPr/>
+      </p:sp>
+      <p:sp>
+        <p:nvSpPr>
+          <p:cNvPr id="3" name="Notes Placeholder 2"/>
+          <p:cNvSpPr>
+            <a:spLocks noGrp="1"/>
+          </p:cNvSpPr>
+          <p:nvPr>
+            <p:ph type="body" idx="1"/>
+          </p:nvPr>
+        </p:nvSpPr>
+        <p:spPr/>
+        <p:txBody>
+          <a:bodyPr/>
+          <a:lstStyle/>
+          <a:p>
+            <a:endParaRPr lang="en-US" dirty="0"/>
+          </a:p>
+        </p:txBody>
+      </p:sp>
+      <p:sp>
+        <p:nvSpPr>
+          <p:cNvPr id="4" name="Slide Number Placeholder 3"/>
+          <p:cNvSpPr>
+            <a:spLocks noGrp="1"/>
+          </p:cNvSpPr>
+          <p:nvPr>
+            <p:ph type="sldNum" sz="quarter" idx="5"/>
+          </p:nvPr>
+        </p:nvSpPr>
+        <p:spPr/>
+        <p:txBody>
+          <a:bodyPr/>
+          <a:lstStyle/>
+          <a:p>
+            <a:fld id="{78455201-7865-8744-8A9B-9F5FC03C5C4C}" type="slidenum">
+              <a:rPr lang="en-US" smtClean="0"/>
+              <a:t>8</a:t>
+            </a:fld>
+            <a:endParaRPr lang="en-US"/>
+          </a:p>
+        </p:txBody>
+      </p:sp>
+    </p:spTree>
+    <p:extLst>
+      <p:ext uri="{BB962C8B-B14F-4D97-AF65-F5344CB8AC3E}">
+        <p14:creationId xmlns:p14="http://schemas.microsoft.com/office/powerpoint/2010/main" val="1043517370"/>
       </p:ext>
     </p:extLst>
   </p:cSld>
@@ -3044,7 +3300,7 @@
             </a:br>
             <a:r>
               <a:rPr lang="en-US" dirty="0"/>
-              <a:t>Fluctuation Plots</a:t>
+              <a:t>In Fill Gain Corrections: E/p vs Laser</a:t>
             </a:r>
             <a:br>
               <a:rPr lang="en-US" dirty="0"/>
@@ -3071,16 +3327,63 @@
                 </a:solidFill>
               </a:rPr>
             </a:br>
-            <a:br>
-              <a:rPr lang="en-GB" sz="2000" dirty="0"/>
-            </a:br>
             <a:r>
               <a:rPr lang="en-US" sz="2000" dirty="0">
                 <a:solidFill>
                   <a:schemeClr val="tx1"/>
                 </a:solidFill>
               </a:rPr>
-              <a:t>7</a:t>
+              <a:t>Europa </a:t>
+            </a:r>
+            <a:r>
+              <a:rPr lang="en-US" sz="2000" dirty="0" err="1">
+                <a:solidFill>
+                  <a:schemeClr val="tx1"/>
+                </a:solidFill>
+              </a:rPr>
+              <a:t>ω</a:t>
+            </a:r>
+            <a:r>
+              <a:rPr lang="en-US" sz="2000" baseline="-25000" dirty="0" err="1">
+                <a:solidFill>
+                  <a:schemeClr val="tx1"/>
+                </a:solidFill>
+              </a:rPr>
+              <a:t>a</a:t>
+            </a:r>
+            <a:r>
+              <a:rPr lang="en-US" sz="2000" baseline="-25000" dirty="0">
+                <a:solidFill>
+                  <a:schemeClr val="tx1"/>
+                </a:solidFill>
+              </a:rPr>
+              <a:t> </a:t>
+            </a:r>
+            <a:r>
+              <a:rPr lang="en-US" sz="2000" dirty="0">
+                <a:solidFill>
+                  <a:schemeClr val="tx1"/>
+                </a:solidFill>
+              </a:rPr>
+              <a:t>Meeting</a:t>
+            </a:r>
+            <a:br>
+              <a:rPr lang="en-US" sz="2000" dirty="0">
+                <a:solidFill>
+                  <a:schemeClr val="tx1"/>
+                </a:solidFill>
+              </a:rPr>
+            </a:br>
+            <a:br>
+              <a:rPr lang="en-GB" sz="2000" dirty="0"/>
+            </a:br>
+            <a:r>
+              <a:rPr lang="en-US" sz="2000" dirty="0">
+                <a:solidFill>
+                  <a:schemeClr val="tx1"/>
+                </a:solidFill>
+              </a:rPr>
+              <a:t>14</a:t>
             </a:r>
             <a:r>
               <a:rPr lang="en-US" sz="2000" baseline="30000" dirty="0">
@@ -3455,8 +3758,8 @@
             </p:nvSpPr>
             <p:spPr>
               <a:xfrm>
-                <a:off x="1631291" y="1999061"/>
-                <a:ext cx="5881418" cy="1048429"/>
+                <a:off x="2834600" y="3979854"/>
+                <a:ext cx="3808286" cy="584647"/>
               </a:xfrm>
               <a:prstGeom prst="rect">
                 <a:avLst/>
@@ -3469,6 +3772,7 @@
               </a:bodyPr>
               <a:lstStyle/>
               <a:p>
+                <a:pPr/>
                 <a14:m>
                   <m:oMathPara xmlns:m="http://schemas.openxmlformats.org/officeDocument/2006/math">
                     <m:oMathParaPr>
@@ -3476,13 +3780,25 @@
                     </m:oMathParaPr>
                     <m:oMath xmlns:m="http://schemas.openxmlformats.org/officeDocument/2006/math">
                       <m:r>
-                        <a:rPr lang="en-GB" sz="3600" b="0" i="1" smtClean="0">
+                        <a:rPr lang="en-GB" sz="2000" b="0" i="1" smtClean="0">
                           <a:latin typeface="Cambria Math" panose="02040503050406030204" pitchFamily="18" charset="0"/>
                         </a:rPr>
-                        <m:t>𝐹𝑙𝑢𝑐𝑡𝑢𝑎𝑡𝑖𝑜𝑛</m:t>
+                        <m:t>𝐹𝑟𝑎𝑐𝑡𝑖𝑜𝑛𝑎𝑙</m:t>
                       </m:r>
                       <m:r>
-                        <a:rPr lang="en-GB" sz="3600" b="0" i="1" smtClean="0">
+                        <a:rPr lang="en-GB" sz="2000" b="0" i="1" smtClean="0">
+                          <a:latin typeface="Cambria Math" panose="02040503050406030204" pitchFamily="18" charset="0"/>
+                        </a:rPr>
+                        <m:t> </m:t>
+                      </m:r>
+                      <m:r>
+                        <a:rPr lang="en-GB" sz="2000" b="0" i="1" smtClean="0">
+                          <a:latin typeface="Cambria Math" panose="02040503050406030204" pitchFamily="18" charset="0"/>
+                        </a:rPr>
+                        <m:t>𝑆h𝑖𝑓𝑡</m:t>
+                      </m:r>
+                      <m:r>
+                        <a:rPr lang="en-GB" sz="2000" b="0" i="1" smtClean="0">
                           <a:latin typeface="Cambria Math" panose="02040503050406030204" pitchFamily="18" charset="0"/>
                         </a:rPr>
                         <m:t>= </m:t>
@@ -3490,38 +3806,38 @@
                       <m:f>
                         <m:fPr>
                           <m:ctrlPr>
-                            <a:rPr lang="en-GB" sz="3600" b="0" i="1" smtClean="0">
+                            <a:rPr lang="en-GB" sz="2000" b="0" i="1" smtClean="0">
                               <a:latin typeface="Cambria Math" panose="02040503050406030204" pitchFamily="18" charset="0"/>
                             </a:rPr>
                           </m:ctrlPr>
                         </m:fPr>
                         <m:num>
                           <m:r>
-                            <a:rPr lang="en-GB" sz="3600" b="0" i="1" smtClean="0">
+                            <a:rPr lang="en-GB" sz="2000" b="0" i="1" smtClean="0">
                               <a:latin typeface="Cambria Math" panose="02040503050406030204" pitchFamily="18" charset="0"/>
                             </a:rPr>
                             <m:t>𝐿𝑎𝑠𝑒𝑟</m:t>
                           </m:r>
                           <m:r>
-                            <a:rPr lang="en-GB" sz="3600" b="0" i="1" smtClean="0">
+                            <a:rPr lang="en-GB" sz="2000" b="0" i="1" smtClean="0">
                               <a:latin typeface="Cambria Math" panose="02040503050406030204" pitchFamily="18" charset="0"/>
                             </a:rPr>
                             <m:t> −</m:t>
                           </m:r>
                           <m:r>
-                            <a:rPr lang="en-GB" sz="3600" b="0" i="1" smtClean="0">
+                            <a:rPr lang="en-GB" sz="2000" b="0" i="1" smtClean="0">
                               <a:latin typeface="Cambria Math" panose="02040503050406030204" pitchFamily="18" charset="0"/>
                             </a:rPr>
                             <m:t>𝐸</m:t>
                           </m:r>
                           <m:r>
-                            <a:rPr lang="en-GB" sz="3600" b="0" i="1" smtClean="0">
+                            <a:rPr lang="en-GB" sz="2000" b="0" i="1" smtClean="0">
                               <a:latin typeface="Cambria Math" panose="02040503050406030204" pitchFamily="18" charset="0"/>
                             </a:rPr>
                             <m:t>/</m:t>
                           </m:r>
                           <m:r>
-                            <a:rPr lang="en-GB" sz="3600" b="0" i="1" smtClean="0">
+                            <a:rPr lang="en-GB" sz="2000" b="0" i="1" smtClean="0">
                               <a:latin typeface="Cambria Math" panose="02040503050406030204" pitchFamily="18" charset="0"/>
                             </a:rPr>
                             <m:t>𝑝</m:t>
@@ -3529,7 +3845,7 @@
                         </m:num>
                         <m:den>
                           <m:r>
-                            <a:rPr lang="en-GB" sz="3600" b="0" i="1" smtClean="0">
+                            <a:rPr lang="en-GB" sz="2000" b="0" i="1" smtClean="0">
                               <a:latin typeface="Cambria Math" panose="02040503050406030204" pitchFamily="18" charset="0"/>
                             </a:rPr>
                             <m:t>𝐿𝑎𝑠𝑒𝑟</m:t>
@@ -3561,8 +3877,8 @@
             </p:nvSpPr>
             <p:spPr>
               <a:xfrm>
-                <a:off x="1631291" y="1999061"/>
-                <a:ext cx="5881418" cy="1048429"/>
+                <a:off x="2834600" y="3979854"/>
+                <a:ext cx="3808286" cy="584647"/>
               </a:xfrm>
               <a:prstGeom prst="rect">
                 <a:avLst/>
@@ -3570,7 +3886,7 @@
               <a:blipFill>
                 <a:blip r:embed="rId2"/>
                 <a:stretch>
-                  <a:fillRect l="-1290" t="-7143" r="-1075" b="-13095"/>
+                  <a:fillRect l="-997" t="-6383" r="-664" b="-12766"/>
                 </a:stretch>
               </a:blipFill>
             </p:spPr>
@@ -3589,6 +3905,152 @@
           </p:sp>
         </mc:Fallback>
       </mc:AlternateContent>
+      <p:sp>
+        <p:nvSpPr>
+          <p:cNvPr id="10" name="TextBox 9">
+            <a:extLst>
+              <a:ext uri="{FF2B5EF4-FFF2-40B4-BE49-F238E27FC236}">
+                <a16:creationId xmlns:a16="http://schemas.microsoft.com/office/drawing/2014/main" id="{3529C833-AF6D-504E-ADF7-0E733B0F3691}"/>
+              </a:ext>
+            </a:extLst>
+          </p:cNvPr>
+          <p:cNvSpPr txBox="1"/>
+          <p:nvPr/>
+        </p:nvSpPr>
+        <p:spPr>
+          <a:xfrm>
+            <a:off x="1324885" y="122000"/>
+            <a:ext cx="6494229" cy="461665"/>
+          </a:xfrm>
+          <a:prstGeom prst="rect">
+            <a:avLst/>
+          </a:prstGeom>
+          <a:noFill/>
+        </p:spPr>
+        <p:txBody>
+          <a:bodyPr wrap="square" rtlCol="0">
+            <a:spAutoFit/>
+          </a:bodyPr>
+          <a:lstStyle/>
+          <a:p>
+            <a:pPr algn="ctr"/>
+            <a:r>
+              <a:rPr lang="en-US" sz="2400" b="1" dirty="0">
+                <a:solidFill>
+                  <a:schemeClr val="bg1"/>
+                </a:solidFill>
+              </a:rPr>
+              <a:t>Overview </a:t>
+            </a:r>
+          </a:p>
+        </p:txBody>
+      </p:sp>
+      <p:sp>
+        <p:nvSpPr>
+          <p:cNvPr id="5" name="TextBox 4">
+            <a:extLst>
+              <a:ext uri="{FF2B5EF4-FFF2-40B4-BE49-F238E27FC236}">
+                <a16:creationId xmlns:a16="http://schemas.microsoft.com/office/drawing/2014/main" id="{93F2927F-532A-784F-8A2C-74EEBB231947}"/>
+              </a:ext>
+            </a:extLst>
+          </p:cNvPr>
+          <p:cNvSpPr txBox="1"/>
+          <p:nvPr/>
+        </p:nvSpPr>
+        <p:spPr>
+          <a:xfrm>
+            <a:off x="677732" y="1017997"/>
+            <a:ext cx="8122023" cy="2585323"/>
+          </a:xfrm>
+          <a:prstGeom prst="rect">
+            <a:avLst/>
+          </a:prstGeom>
+          <a:noFill/>
+        </p:spPr>
+        <p:txBody>
+          <a:bodyPr wrap="square" rtlCol="0">
+            <a:spAutoFit/>
+          </a:bodyPr>
+          <a:lstStyle/>
+          <a:p>
+            <a:pPr marL="285750" indent="-285750">
+              <a:buFont typeface="Arial" panose="020B0604020202020204" pitchFamily="34" charset="0"/>
+              <a:buChar char="•"/>
+            </a:pPr>
+            <a:r>
+              <a:rPr lang="en-US" dirty="0"/>
+              <a:t> Derive the recovery times and amplitudes using E/p</a:t>
+            </a:r>
+          </a:p>
+          <a:p>
+            <a:r>
+              <a:rPr lang="en-US" dirty="0"/>
+              <a:t> </a:t>
+            </a:r>
+          </a:p>
+          <a:p>
+            <a:pPr marL="285750" indent="-285750">
+              <a:buFont typeface="Arial" panose="020B0604020202020204" pitchFamily="34" charset="0"/>
+              <a:buChar char="•"/>
+            </a:pPr>
+            <a:r>
+              <a:rPr lang="en-US" dirty="0"/>
+              <a:t>We don’t care about outliers, so cut these</a:t>
+            </a:r>
+          </a:p>
+          <a:p>
+            <a:pPr marL="285750" indent="-285750">
+              <a:buFont typeface="Arial" panose="020B0604020202020204" pitchFamily="34" charset="0"/>
+              <a:buChar char="•"/>
+            </a:pPr>
+            <a:endParaRPr lang="en-US" dirty="0"/>
+          </a:p>
+          <a:p>
+            <a:pPr marL="285750" indent="-285750">
+              <a:buFont typeface="Arial" panose="020B0604020202020204" pitchFamily="34" charset="0"/>
+              <a:buChar char="•"/>
+            </a:pPr>
+            <a:r>
+              <a:rPr lang="en-US" dirty="0"/>
+              <a:t>Quantify the level of deviation between laser and E/p:</a:t>
+            </a:r>
+          </a:p>
+          <a:p>
+            <a:pPr marL="285750" indent="-285750">
+              <a:buFont typeface="Arial" panose="020B0604020202020204" pitchFamily="34" charset="0"/>
+              <a:buChar char="•"/>
+            </a:pPr>
+            <a:endParaRPr lang="en-US" dirty="0"/>
+          </a:p>
+          <a:p>
+            <a:pPr marL="742950" lvl="1" indent="-285750">
+              <a:buFont typeface="Arial" panose="020B0604020202020204" pitchFamily="34" charset="0"/>
+              <a:buChar char="•"/>
+            </a:pPr>
+            <a:r>
+              <a:rPr lang="en-US" dirty="0"/>
+              <a:t>We can use the pull per crystal in units of sigma</a:t>
+            </a:r>
+          </a:p>
+          <a:p>
+            <a:pPr marL="742950" lvl="1" indent="-285750">
+              <a:buFont typeface="Arial" panose="020B0604020202020204" pitchFamily="34" charset="0"/>
+              <a:buChar char="•"/>
+            </a:pPr>
+            <a:endParaRPr lang="en-US" dirty="0"/>
+          </a:p>
+          <a:p>
+            <a:pPr marL="742950" lvl="1" indent="-285750">
+              <a:buFont typeface="Arial" panose="020B0604020202020204" pitchFamily="34" charset="0"/>
+              <a:buChar char="•"/>
+            </a:pPr>
+            <a:r>
+              <a:rPr lang="en-US" dirty="0"/>
+              <a:t> As well as the fractional shift per crystal </a:t>
+            </a:r>
+          </a:p>
+        </p:txBody>
+      </p:sp>
     </p:spTree>
     <p:extLst>
       <p:ext uri="{BB962C8B-B14F-4D97-AF65-F5344CB8AC3E}">
@@ -3895,70 +4357,255 @@
           </a:p>
         </p:txBody>
       </p:sp>
-      <p:pic>
-        <p:nvPicPr>
-          <p:cNvPr id="20" name="Picture 19" descr="A screenshot of a cell phone&#10;&#10;Description automatically generated">
+      <p:sp>
+        <p:nvSpPr>
+          <p:cNvPr id="10" name="TextBox 9">
             <a:extLst>
               <a:ext uri="{FF2B5EF4-FFF2-40B4-BE49-F238E27FC236}">
-                <a16:creationId xmlns:a16="http://schemas.microsoft.com/office/drawing/2014/main" id="{B954DFF3-1023-4A45-A3F2-CC9CE4D400E6}"/>
+                <a16:creationId xmlns:a16="http://schemas.microsoft.com/office/drawing/2014/main" id="{3529C833-AF6D-504E-ADF7-0E733B0F3691}"/>
               </a:ext>
             </a:extLst>
           </p:cNvPr>
-          <p:cNvPicPr>
-            <a:picLocks noChangeAspect="1"/>
-          </p:cNvPicPr>
+          <p:cNvSpPr txBox="1"/>
           <p:nvPr/>
-        </p:nvPicPr>
-        <p:blipFill>
-          <a:blip r:embed="rId2"/>
-          <a:stretch>
-            <a:fillRect/>
-          </a:stretch>
-        </p:blipFill>
+        </p:nvSpPr>
         <p:spPr>
           <a:xfrm>
-            <a:off x="219494" y="1330458"/>
-            <a:ext cx="4419600" cy="2997200"/>
+            <a:off x="1324885" y="122000"/>
+            <a:ext cx="6494229" cy="461665"/>
           </a:xfrm>
           <a:prstGeom prst="rect">
             <a:avLst/>
           </a:prstGeom>
+          <a:noFill/>
         </p:spPr>
-      </p:pic>
-      <p:pic>
-        <p:nvPicPr>
-          <p:cNvPr id="26" name="Picture 25" descr="A screenshot of a cell phone&#10;&#10;Description automatically generated">
+        <p:txBody>
+          <a:bodyPr wrap="square" rtlCol="0">
+            <a:spAutoFit/>
+          </a:bodyPr>
+          <a:lstStyle/>
+          <a:p>
+            <a:pPr algn="ctr"/>
+            <a:r>
+              <a:rPr lang="en-US" sz="2400" b="1" dirty="0">
+                <a:solidFill>
+                  <a:schemeClr val="bg1"/>
+                </a:solidFill>
+              </a:rPr>
+              <a:t>Cuts on fits per crystal</a:t>
+            </a:r>
+          </a:p>
+        </p:txBody>
+      </p:sp>
+      <p:sp>
+        <p:nvSpPr>
+          <p:cNvPr id="5" name="TextBox 4">
             <a:extLst>
               <a:ext uri="{FF2B5EF4-FFF2-40B4-BE49-F238E27FC236}">
-                <a16:creationId xmlns:a16="http://schemas.microsoft.com/office/drawing/2014/main" id="{FF7C80FE-5C0D-C24B-920A-487448EAA541}"/>
+                <a16:creationId xmlns:a16="http://schemas.microsoft.com/office/drawing/2014/main" id="{93F2927F-532A-784F-8A2C-74EEBB231947}"/>
               </a:ext>
             </a:extLst>
           </p:cNvPr>
-          <p:cNvPicPr>
-            <a:picLocks noChangeAspect="1"/>
-          </p:cNvPicPr>
+          <p:cNvSpPr txBox="1"/>
           <p:nvPr/>
-        </p:nvPicPr>
-        <p:blipFill>
-          <a:blip r:embed="rId3"/>
-          <a:stretch>
-            <a:fillRect/>
-          </a:stretch>
-        </p:blipFill>
+        </p:nvSpPr>
         <p:spPr>
           <a:xfrm>
-            <a:off x="4657954" y="1364299"/>
-            <a:ext cx="4419600" cy="2997200"/>
+            <a:off x="-827699" y="1473393"/>
+            <a:ext cx="28712804" cy="2677656"/>
           </a:xfrm>
           <a:prstGeom prst="rect">
             <a:avLst/>
           </a:prstGeom>
+          <a:noFill/>
         </p:spPr>
-      </p:pic>
+        <p:txBody>
+          <a:bodyPr wrap="square" rtlCol="0">
+            <a:spAutoFit/>
+          </a:bodyPr>
+          <a:lstStyle/>
+          <a:p>
+            <a:r>
+              <a:rPr lang="en-GB" sz="2400" dirty="0">
+                <a:latin typeface="Consolas" panose="020B0609020204030204" pitchFamily="49" charset="0"/>
+                <a:cs typeface="Consolas" panose="020B0609020204030204" pitchFamily="49" charset="0"/>
+              </a:rPr>
+              <a:t>   	   //QUALITY CUTS                                                                                                                                </a:t>
+            </a:r>
+          </a:p>
+          <a:p>
+            <a:r>
+              <a:rPr lang="en-GB" sz="2400" dirty="0">
+                <a:latin typeface="Consolas" panose="020B0609020204030204" pitchFamily="49" charset="0"/>
+                <a:cs typeface="Consolas" panose="020B0609020204030204" pitchFamily="49" charset="0"/>
+              </a:rPr>
+              <a:t>        </a:t>
+            </a:r>
+            <a:r>
+              <a:rPr lang="en-GB" sz="2400" b="1" dirty="0">
+                <a:latin typeface="Consolas" panose="020B0609020204030204" pitchFamily="49" charset="0"/>
+                <a:cs typeface="Consolas" panose="020B0609020204030204" pitchFamily="49" charset="0"/>
+              </a:rPr>
+              <a:t>// Require high stats</a:t>
+            </a:r>
+            <a:r>
+              <a:rPr lang="en-GB" sz="2400" dirty="0">
+                <a:latin typeface="Consolas" panose="020B0609020204030204" pitchFamily="49" charset="0"/>
+                <a:cs typeface="Consolas" panose="020B0609020204030204" pitchFamily="49" charset="0"/>
+              </a:rPr>
+              <a:t>                                                                                                                       </a:t>
+            </a:r>
+          </a:p>
+          <a:p>
+            <a:r>
+              <a:rPr lang="en-GB" sz="2400" dirty="0">
+                <a:latin typeface="Consolas" panose="020B0609020204030204" pitchFamily="49" charset="0"/>
+                <a:cs typeface="Consolas" panose="020B0609020204030204" pitchFamily="49" charset="0"/>
+              </a:rPr>
+              <a:t>        if (N &lt; 100000) continue;</a:t>
+            </a:r>
+          </a:p>
+          <a:p>
+            <a:r>
+              <a:rPr lang="en-GB" sz="2400" dirty="0">
+                <a:latin typeface="Consolas" panose="020B0609020204030204" pitchFamily="49" charset="0"/>
+                <a:cs typeface="Consolas" panose="020B0609020204030204" pitchFamily="49" charset="0"/>
+              </a:rPr>
+              <a:t>       </a:t>
+            </a:r>
+            <a:r>
+              <a:rPr lang="en-GB" sz="2400" b="1" dirty="0">
+                <a:latin typeface="Consolas" panose="020B0609020204030204" pitchFamily="49" charset="0"/>
+                <a:cs typeface="Consolas" panose="020B0609020204030204" pitchFamily="49" charset="0"/>
+              </a:rPr>
+              <a:t> // Allow reduced chi squared +/- 25% from unity</a:t>
+            </a:r>
+            <a:r>
+              <a:rPr lang="en-GB" sz="2400" dirty="0">
+                <a:latin typeface="Consolas" panose="020B0609020204030204" pitchFamily="49" charset="0"/>
+                <a:cs typeface="Consolas" panose="020B0609020204030204" pitchFamily="49" charset="0"/>
+              </a:rPr>
+              <a:t>                                                                                                                 </a:t>
+            </a:r>
+          </a:p>
+          <a:p>
+            <a:r>
+              <a:rPr lang="en-GB" sz="2400" dirty="0">
+                <a:latin typeface="Consolas" panose="020B0609020204030204" pitchFamily="49" charset="0"/>
+                <a:cs typeface="Consolas" panose="020B0609020204030204" pitchFamily="49" charset="0"/>
+              </a:rPr>
+              <a:t>        if(</a:t>
+            </a:r>
+            <a:r>
+              <a:rPr lang="en-GB" sz="2400" dirty="0" err="1">
+                <a:latin typeface="Consolas" panose="020B0609020204030204" pitchFamily="49" charset="0"/>
+                <a:cs typeface="Consolas" panose="020B0609020204030204" pitchFamily="49" charset="0"/>
+              </a:rPr>
+              <a:t>chiSqrNDF</a:t>
+            </a:r>
+            <a:r>
+              <a:rPr lang="en-GB" sz="2400" dirty="0">
+                <a:latin typeface="Consolas" panose="020B0609020204030204" pitchFamily="49" charset="0"/>
+                <a:cs typeface="Consolas" panose="020B0609020204030204" pitchFamily="49" charset="0"/>
+              </a:rPr>
+              <a:t> &lt; 0.25 || </a:t>
+            </a:r>
+            <a:r>
+              <a:rPr lang="en-GB" sz="2400" dirty="0" err="1">
+                <a:latin typeface="Consolas" panose="020B0609020204030204" pitchFamily="49" charset="0"/>
+                <a:cs typeface="Consolas" panose="020B0609020204030204" pitchFamily="49" charset="0"/>
+              </a:rPr>
+              <a:t>chiSqrNDF</a:t>
+            </a:r>
+            <a:r>
+              <a:rPr lang="en-GB" sz="2400" dirty="0">
+                <a:latin typeface="Consolas" panose="020B0609020204030204" pitchFamily="49" charset="0"/>
+                <a:cs typeface="Consolas" panose="020B0609020204030204" pitchFamily="49" charset="0"/>
+              </a:rPr>
+              <a:t> &gt; 4) continue;                                                                                 </a:t>
+            </a:r>
+          </a:p>
+          <a:p>
+            <a:r>
+              <a:rPr lang="en-GB" sz="2400" dirty="0">
+                <a:latin typeface="Consolas" panose="020B0609020204030204" pitchFamily="49" charset="0"/>
+                <a:cs typeface="Consolas" panose="020B0609020204030204" pitchFamily="49" charset="0"/>
+              </a:rPr>
+              <a:t>        </a:t>
+            </a:r>
+            <a:r>
+              <a:rPr lang="en-GB" sz="2400" b="1" dirty="0">
+                <a:latin typeface="Consolas" panose="020B0609020204030204" pitchFamily="49" charset="0"/>
+                <a:cs typeface="Consolas" panose="020B0609020204030204" pitchFamily="49" charset="0"/>
+              </a:rPr>
+              <a:t>// Cut unphysical params as last resort   </a:t>
+            </a:r>
+            <a:r>
+              <a:rPr lang="en-GB" sz="2400" dirty="0">
+                <a:latin typeface="Consolas" panose="020B0609020204030204" pitchFamily="49" charset="0"/>
+                <a:cs typeface="Consolas" panose="020B0609020204030204" pitchFamily="49" charset="0"/>
+              </a:rPr>
+              <a:t>                                                                                                  </a:t>
+            </a:r>
+          </a:p>
+          <a:p>
+            <a:r>
+              <a:rPr lang="en-GB" sz="2400" dirty="0">
+                <a:latin typeface="Consolas" panose="020B0609020204030204" pitchFamily="49" charset="0"/>
+                <a:cs typeface="Consolas" panose="020B0609020204030204" pitchFamily="49" charset="0"/>
+              </a:rPr>
+              <a:t>        if(tau &gt; 25 || A &gt; 0.1) continue;</a:t>
+            </a:r>
+          </a:p>
+        </p:txBody>
+      </p:sp>
+      <p:sp>
+        <p:nvSpPr>
+          <p:cNvPr id="2" name="TextBox 1">
+            <a:extLst>
+              <a:ext uri="{FF2B5EF4-FFF2-40B4-BE49-F238E27FC236}">
+                <a16:creationId xmlns:a16="http://schemas.microsoft.com/office/drawing/2014/main" id="{CCED0B4F-DB86-A142-89D0-DD94F58B4E03}"/>
+              </a:ext>
+            </a:extLst>
+          </p:cNvPr>
+          <p:cNvSpPr txBox="1"/>
+          <p:nvPr/>
+        </p:nvSpPr>
+        <p:spPr>
+          <a:xfrm>
+            <a:off x="497518" y="896249"/>
+            <a:ext cx="9839178" cy="369332"/>
+          </a:xfrm>
+          <a:prstGeom prst="rect">
+            <a:avLst/>
+          </a:prstGeom>
+          <a:noFill/>
+        </p:spPr>
+        <p:txBody>
+          <a:bodyPr wrap="square" rtlCol="0">
+            <a:spAutoFit/>
+          </a:bodyPr>
+          <a:lstStyle/>
+          <a:p>
+            <a:r>
+              <a:rPr lang="en-US" dirty="0"/>
+              <a:t>These are vital, but I’m still tuning them. </a:t>
+            </a:r>
+            <a:r>
+              <a:rPr lang="en-US" b="1" dirty="0"/>
+              <a:t>Is it OK to cut on the parameters themselves</a:t>
+            </a:r>
+            <a:r>
+              <a:rPr lang="en-US" dirty="0"/>
+              <a:t>? </a:t>
+            </a:r>
+          </a:p>
+        </p:txBody>
+      </p:sp>
     </p:spTree>
     <p:extLst>
       <p:ext uri="{BB962C8B-B14F-4D97-AF65-F5344CB8AC3E}">
-        <p14:creationId xmlns:p14="http://schemas.microsoft.com/office/powerpoint/2010/main" val="4253472782"/>
+        <p14:creationId xmlns:p14="http://schemas.microsoft.com/office/powerpoint/2010/main" val="1154097626"/>
       </p:ext>
     </p:extLst>
   </p:cSld>
@@ -4004,7 +4651,7 @@
         <p:spPr>
           <a:xfrm>
             <a:off x="200633" y="887767"/>
-            <a:ext cx="3820930" cy="3033983"/>
+            <a:ext cx="8742734" cy="4031139"/>
           </a:xfrm>
           <a:prstGeom prst="rect">
             <a:avLst/>
@@ -4059,9 +4706,8 @@
             </a:endParaRPr>
           </a:p>
           <a:p>
-            <a:pPr marL="342900" indent="-342900">
-              <a:buFont typeface="+mj-lt"/>
-              <a:buAutoNum type="arabicPeriod"/>
+            <a:pPr marL="0" indent="0">
+              <a:buNone/>
             </a:pPr>
             <a:endParaRPr lang="en-US" sz="2400" b="0" dirty="0">
               <a:solidFill>
@@ -4096,16 +4742,248 @@
               <a:rPr lang="en-US" smtClean="0"/>
               <a:t>3</a:t>
             </a:fld>
-            <a:endParaRPr lang="en-US"/>
+            <a:endParaRPr lang="en-US" dirty="0"/>
+          </a:p>
+        </p:txBody>
+      </p:sp>
+      <p:sp>
+        <p:nvSpPr>
+          <p:cNvPr id="13" name="Rectangle 12">
+            <a:extLst>
+              <a:ext uri="{FF2B5EF4-FFF2-40B4-BE49-F238E27FC236}">
+                <a16:creationId xmlns:a16="http://schemas.microsoft.com/office/drawing/2014/main" id="{C9D204E4-FBA7-CF42-923B-64634650C151}"/>
+              </a:ext>
+            </a:extLst>
+          </p:cNvPr>
+          <p:cNvSpPr/>
+          <p:nvPr/>
+        </p:nvSpPr>
+        <p:spPr>
+          <a:xfrm>
+            <a:off x="5536308" y="2417360"/>
+            <a:ext cx="874207" cy="459136"/>
+          </a:xfrm>
+          <a:prstGeom prst="rect">
+            <a:avLst/>
+          </a:prstGeom>
+          <a:solidFill>
+            <a:schemeClr val="bg1"/>
+          </a:solidFill>
+          <a:ln>
+            <a:solidFill>
+              <a:schemeClr val="bg1"/>
+            </a:solidFill>
+          </a:ln>
+        </p:spPr>
+        <p:style>
+          <a:lnRef idx="2">
+            <a:schemeClr val="accent1">
+              <a:shade val="50000"/>
+            </a:schemeClr>
+          </a:lnRef>
+          <a:fillRef idx="1">
+            <a:schemeClr val="accent1"/>
+          </a:fillRef>
+          <a:effectRef idx="0">
+            <a:schemeClr val="accent1"/>
+          </a:effectRef>
+          <a:fontRef idx="minor">
+            <a:schemeClr val="lt1"/>
+          </a:fontRef>
+        </p:style>
+        <p:txBody>
+          <a:bodyPr rtlCol="0" anchor="ctr"/>
+          <a:lstStyle/>
+          <a:p>
+            <a:pPr algn="ctr"/>
+            <a:endParaRPr lang="en-US" dirty="0"/>
+          </a:p>
+        </p:txBody>
+      </p:sp>
+      <p:sp>
+        <p:nvSpPr>
+          <p:cNvPr id="15" name="Rectangle 14">
+            <a:extLst>
+              <a:ext uri="{FF2B5EF4-FFF2-40B4-BE49-F238E27FC236}">
+                <a16:creationId xmlns:a16="http://schemas.microsoft.com/office/drawing/2014/main" id="{BF3A06E8-129E-A84D-8A62-EE93024293F7}"/>
+              </a:ext>
+            </a:extLst>
+          </p:cNvPr>
+          <p:cNvSpPr/>
+          <p:nvPr/>
+        </p:nvSpPr>
+        <p:spPr>
+          <a:xfrm>
+            <a:off x="6080928" y="774501"/>
+            <a:ext cx="289394" cy="243496"/>
+          </a:xfrm>
+          <a:prstGeom prst="rect">
+            <a:avLst/>
+          </a:prstGeom>
+          <a:solidFill>
+            <a:schemeClr val="bg1"/>
+          </a:solidFill>
+          <a:ln>
+            <a:solidFill>
+              <a:schemeClr val="bg1"/>
+            </a:solidFill>
+          </a:ln>
+        </p:spPr>
+        <p:style>
+          <a:lnRef idx="2">
+            <a:schemeClr val="accent1">
+              <a:shade val="50000"/>
+            </a:schemeClr>
+          </a:lnRef>
+          <a:fillRef idx="1">
+            <a:schemeClr val="accent1"/>
+          </a:fillRef>
+          <a:effectRef idx="0">
+            <a:schemeClr val="accent1"/>
+          </a:effectRef>
+          <a:fontRef idx="minor">
+            <a:schemeClr val="lt1"/>
+          </a:fontRef>
+        </p:style>
+        <p:txBody>
+          <a:bodyPr rtlCol="0" anchor="ctr"/>
+          <a:lstStyle/>
+          <a:p>
+            <a:pPr algn="ctr"/>
+            <a:endParaRPr lang="en-US" dirty="0"/>
+          </a:p>
+        </p:txBody>
+      </p:sp>
+      <p:sp>
+        <p:nvSpPr>
+          <p:cNvPr id="18" name="Rectangle 17">
+            <a:extLst>
+              <a:ext uri="{FF2B5EF4-FFF2-40B4-BE49-F238E27FC236}">
+                <a16:creationId xmlns:a16="http://schemas.microsoft.com/office/drawing/2014/main" id="{B8D878C0-EFAE-9E42-893F-A95B3986F169}"/>
+              </a:ext>
+            </a:extLst>
+          </p:cNvPr>
+          <p:cNvSpPr/>
+          <p:nvPr/>
+        </p:nvSpPr>
+        <p:spPr>
+          <a:xfrm>
+            <a:off x="6171137" y="871322"/>
+            <a:ext cx="874207" cy="459136"/>
+          </a:xfrm>
+          <a:prstGeom prst="rect">
+            <a:avLst/>
+          </a:prstGeom>
+          <a:solidFill>
+            <a:schemeClr val="bg1"/>
+          </a:solidFill>
+          <a:ln>
+            <a:solidFill>
+              <a:schemeClr val="bg1"/>
+            </a:solidFill>
+          </a:ln>
+        </p:spPr>
+        <p:style>
+          <a:lnRef idx="2">
+            <a:schemeClr val="accent1">
+              <a:shade val="50000"/>
+            </a:schemeClr>
+          </a:lnRef>
+          <a:fillRef idx="1">
+            <a:schemeClr val="accent1"/>
+          </a:fillRef>
+          <a:effectRef idx="0">
+            <a:schemeClr val="accent1"/>
+          </a:effectRef>
+          <a:fontRef idx="minor">
+            <a:schemeClr val="lt1"/>
+          </a:fontRef>
+        </p:style>
+        <p:txBody>
+          <a:bodyPr rtlCol="0" anchor="ctr"/>
+          <a:lstStyle/>
+          <a:p>
+            <a:pPr algn="ctr"/>
+            <a:endParaRPr lang="en-US" dirty="0"/>
+          </a:p>
+        </p:txBody>
+      </p:sp>
+      <p:sp>
+        <p:nvSpPr>
+          <p:cNvPr id="9" name="TextBox 8">
+            <a:extLst>
+              <a:ext uri="{FF2B5EF4-FFF2-40B4-BE49-F238E27FC236}">
+                <a16:creationId xmlns:a16="http://schemas.microsoft.com/office/drawing/2014/main" id="{B52B2448-8F6C-9C43-82C9-36CDA6C30E18}"/>
+              </a:ext>
+            </a:extLst>
+          </p:cNvPr>
+          <p:cNvSpPr txBox="1"/>
+          <p:nvPr/>
+        </p:nvSpPr>
+        <p:spPr>
+          <a:xfrm>
+            <a:off x="1324885" y="122000"/>
+            <a:ext cx="6494229" cy="461665"/>
+          </a:xfrm>
+          <a:prstGeom prst="rect">
+            <a:avLst/>
+          </a:prstGeom>
+          <a:noFill/>
+        </p:spPr>
+        <p:txBody>
+          <a:bodyPr wrap="square" rtlCol="0">
+            <a:spAutoFit/>
+          </a:bodyPr>
+          <a:lstStyle/>
+          <a:p>
+            <a:pPr algn="ctr"/>
+            <a:r>
+              <a:rPr lang="en-US" sz="2400" b="1" dirty="0">
+                <a:solidFill>
+                  <a:schemeClr val="bg1"/>
+                </a:solidFill>
+              </a:rPr>
+              <a:t>Cuts Illustration</a:t>
+            </a:r>
           </a:p>
         </p:txBody>
       </p:sp>
       <p:pic>
         <p:nvPicPr>
-          <p:cNvPr id="11" name="Picture 10" descr="A screenshot of a cell phone&#10;&#10;Description automatically generated">
+          <p:cNvPr id="4" name="Picture 3" descr="A screenshot of a cell phone&#10;&#10;Description automatically generated">
             <a:extLst>
               <a:ext uri="{FF2B5EF4-FFF2-40B4-BE49-F238E27FC236}">
-                <a16:creationId xmlns:a16="http://schemas.microsoft.com/office/drawing/2014/main" id="{9A5B94A7-C61A-3D46-9002-40D47F95AAC5}"/>
+                <a16:creationId xmlns:a16="http://schemas.microsoft.com/office/drawing/2014/main" id="{A0679873-7484-3543-B529-6F72830EA5B3}"/>
+              </a:ext>
+            </a:extLst>
+          </p:cNvPr>
+          <p:cNvPicPr>
+            <a:picLocks noChangeAspect="1"/>
+          </p:cNvPicPr>
+          <p:nvPr/>
+        </p:nvPicPr>
+        <p:blipFill>
+          <a:blip r:embed="rId2"/>
+          <a:stretch>
+            <a:fillRect/>
+          </a:stretch>
+        </p:blipFill>
+        <p:spPr>
+          <a:xfrm>
+            <a:off x="5005162" y="810143"/>
+            <a:ext cx="3185084" cy="2160000"/>
+          </a:xfrm>
+          <a:prstGeom prst="rect">
+            <a:avLst/>
+          </a:prstGeom>
+        </p:spPr>
+      </p:pic>
+      <p:pic>
+        <p:nvPicPr>
+          <p:cNvPr id="6" name="Picture 5" descr="A screenshot of a cell phone&#10;&#10;Description automatically generated">
+            <a:extLst>
+              <a:ext uri="{FF2B5EF4-FFF2-40B4-BE49-F238E27FC236}">
+                <a16:creationId xmlns:a16="http://schemas.microsoft.com/office/drawing/2014/main" id="{FBAEA53E-367C-4941-97CD-0DAD5D443F2B}"/>
               </a:ext>
             </a:extLst>
           </p:cNvPr>
@@ -4122,8 +5000,8 @@
         </p:blipFill>
         <p:spPr>
           <a:xfrm>
-            <a:off x="152400" y="1221750"/>
-            <a:ext cx="4419600" cy="2997200"/>
+            <a:off x="609749" y="763775"/>
+            <a:ext cx="3185084" cy="2160000"/>
           </a:xfrm>
           <a:prstGeom prst="rect">
             <a:avLst/>
@@ -4132,10 +5010,10 @@
       </p:pic>
       <p:pic>
         <p:nvPicPr>
-          <p:cNvPr id="12" name="Picture 11" descr="A screenshot of a cell phone&#10;&#10;Description automatically generated">
+          <p:cNvPr id="10" name="Picture 9" descr="A screenshot of a cell phone&#10;&#10;Description automatically generated">
             <a:extLst>
               <a:ext uri="{FF2B5EF4-FFF2-40B4-BE49-F238E27FC236}">
-                <a16:creationId xmlns:a16="http://schemas.microsoft.com/office/drawing/2014/main" id="{B82F32C5-7CEF-AC44-A5A0-E18A6F68E6FA}"/>
+                <a16:creationId xmlns:a16="http://schemas.microsoft.com/office/drawing/2014/main" id="{7836A6AA-F40D-934B-A82B-9D2BA0B55BB4}"/>
               </a:ext>
             </a:extLst>
           </p:cNvPr>
@@ -4152,18 +5030,89 @@
         </p:blipFill>
         <p:spPr>
           <a:xfrm>
-            <a:off x="4577787" y="1221750"/>
-            <a:ext cx="4419600" cy="2997200"/>
+            <a:off x="608372" y="2882898"/>
+            <a:ext cx="3185085" cy="2160000"/>
           </a:xfrm>
           <a:prstGeom prst="rect">
             <a:avLst/>
           </a:prstGeom>
         </p:spPr>
       </p:pic>
+      <p:pic>
+        <p:nvPicPr>
+          <p:cNvPr id="12" name="Picture 11" descr="A screenshot of a cell phone&#10;&#10;Description automatically generated">
+            <a:extLst>
+              <a:ext uri="{FF2B5EF4-FFF2-40B4-BE49-F238E27FC236}">
+                <a16:creationId xmlns:a16="http://schemas.microsoft.com/office/drawing/2014/main" id="{827BC7AE-721B-F340-B65E-1AB14EE7DC46}"/>
+              </a:ext>
+            </a:extLst>
+          </p:cNvPr>
+          <p:cNvPicPr>
+            <a:picLocks noChangeAspect="1"/>
+          </p:cNvPicPr>
+          <p:nvPr/>
+        </p:nvPicPr>
+        <p:blipFill>
+          <a:blip r:embed="rId5"/>
+          <a:stretch>
+            <a:fillRect/>
+          </a:stretch>
+        </p:blipFill>
+        <p:spPr>
+          <a:xfrm>
+            <a:off x="5015697" y="2970143"/>
+            <a:ext cx="3185085" cy="2160000"/>
+          </a:xfrm>
+          <a:prstGeom prst="rect">
+            <a:avLst/>
+          </a:prstGeom>
+        </p:spPr>
+      </p:pic>
+      <p:cxnSp>
+        <p:nvCxnSpPr>
+          <p:cNvPr id="16" name="Straight Arrow Connector 15">
+            <a:extLst>
+              <a:ext uri="{FF2B5EF4-FFF2-40B4-BE49-F238E27FC236}">
+                <a16:creationId xmlns:a16="http://schemas.microsoft.com/office/drawing/2014/main" id="{B9765671-6FA4-A540-AB96-8B427F92D287}"/>
+              </a:ext>
+            </a:extLst>
+          </p:cNvPr>
+          <p:cNvCxnSpPr>
+            <a:cxnSpLocks/>
+          </p:cNvCxnSpPr>
+          <p:nvPr/>
+        </p:nvCxnSpPr>
+        <p:spPr>
+          <a:xfrm>
+            <a:off x="3697357" y="2769704"/>
+            <a:ext cx="1318340" cy="0"/>
+          </a:xfrm>
+          <a:prstGeom prst="straightConnector1">
+            <a:avLst/>
+          </a:prstGeom>
+          <a:ln>
+            <a:tailEnd type="triangle"/>
+          </a:ln>
+        </p:spPr>
+        <p:style>
+          <a:lnRef idx="1">
+            <a:schemeClr val="accent1"/>
+          </a:lnRef>
+          <a:fillRef idx="0">
+            <a:schemeClr val="accent1"/>
+          </a:fillRef>
+          <a:effectRef idx="0">
+            <a:schemeClr val="accent1"/>
+          </a:effectRef>
+          <a:fontRef idx="minor">
+            <a:schemeClr val="tx1"/>
+          </a:fontRef>
+        </p:style>
+      </p:cxnSp>
     </p:spTree>
     <p:extLst>
       <p:ext uri="{BB962C8B-B14F-4D97-AF65-F5344CB8AC3E}">
-        <p14:creationId xmlns:p14="http://schemas.microsoft.com/office/powerpoint/2010/main" val="2167622201"/>
+        <p14:creationId xmlns:p14="http://schemas.microsoft.com/office/powerpoint/2010/main" val="4253472782"/>
       </p:ext>
     </p:extLst>
   </p:cSld>
@@ -4307,10 +5256,10 @@
       </p:sp>
       <p:sp>
         <p:nvSpPr>
-          <p:cNvPr id="2" name="TextBox 1">
+          <p:cNvPr id="6" name="TextBox 5">
             <a:extLst>
               <a:ext uri="{FF2B5EF4-FFF2-40B4-BE49-F238E27FC236}">
-                <a16:creationId xmlns:a16="http://schemas.microsoft.com/office/drawing/2014/main" id="{149D0144-BF1D-1B46-B0CF-BE8E39F5BB26}"/>
+                <a16:creationId xmlns:a16="http://schemas.microsoft.com/office/drawing/2014/main" id="{B9824855-4325-CF4A-9136-57AC87524A58}"/>
               </a:ext>
             </a:extLst>
           </p:cNvPr>
@@ -4319,8 +5268,8 @@
         </p:nvSpPr>
         <p:spPr>
           <a:xfrm>
-            <a:off x="1169622" y="2081592"/>
-            <a:ext cx="6745045" cy="646331"/>
+            <a:off x="1324885" y="122000"/>
+            <a:ext cx="6494229" cy="461665"/>
           </a:xfrm>
           <a:prstGeom prst="rect">
             <a:avLst/>
@@ -4333,9 +5282,551 @@
           </a:bodyPr>
           <a:lstStyle/>
           <a:p>
+            <a:pPr algn="ctr"/>
+            <a:r>
+              <a:rPr lang="en-US" sz="2400" b="1" dirty="0">
+                <a:solidFill>
+                  <a:schemeClr val="bg1"/>
+                </a:solidFill>
+              </a:rPr>
+              <a:t>Pull</a:t>
+            </a:r>
+          </a:p>
+        </p:txBody>
+      </p:sp>
+      <p:pic>
+        <p:nvPicPr>
+          <p:cNvPr id="4" name="Picture 3">
+            <a:extLst>
+              <a:ext uri="{FF2B5EF4-FFF2-40B4-BE49-F238E27FC236}">
+                <a16:creationId xmlns:a16="http://schemas.microsoft.com/office/drawing/2014/main" id="{FD1D97AB-54DE-D04B-AF3E-818844AB52B4}"/>
+              </a:ext>
+            </a:extLst>
+          </p:cNvPr>
+          <p:cNvPicPr>
+            <a:picLocks noChangeAspect="1"/>
+          </p:cNvPicPr>
+          <p:nvPr/>
+        </p:nvPicPr>
+        <p:blipFill>
+          <a:blip r:embed="rId3"/>
+          <a:stretch>
+            <a:fillRect/>
+          </a:stretch>
+        </p:blipFill>
+        <p:spPr>
+          <a:xfrm>
+            <a:off x="495106" y="800223"/>
+            <a:ext cx="2919661" cy="1980000"/>
+          </a:xfrm>
+          <a:prstGeom prst="rect">
+            <a:avLst/>
+          </a:prstGeom>
+        </p:spPr>
+      </p:pic>
+      <p:pic>
+        <p:nvPicPr>
+          <p:cNvPr id="7" name="Picture 6">
+            <a:extLst>
+              <a:ext uri="{FF2B5EF4-FFF2-40B4-BE49-F238E27FC236}">
+                <a16:creationId xmlns:a16="http://schemas.microsoft.com/office/drawing/2014/main" id="{B81B1CEE-6E34-FE44-8404-1BEF5BD7E3BD}"/>
+              </a:ext>
+            </a:extLst>
+          </p:cNvPr>
+          <p:cNvPicPr>
+            <a:picLocks noChangeAspect="1"/>
+          </p:cNvPicPr>
+          <p:nvPr/>
+        </p:nvPicPr>
+        <p:blipFill>
+          <a:blip r:embed="rId4"/>
+          <a:stretch>
+            <a:fillRect/>
+          </a:stretch>
+        </p:blipFill>
+        <p:spPr>
+          <a:xfrm>
+            <a:off x="3709240" y="800223"/>
+            <a:ext cx="2919661" cy="1980000"/>
+          </a:xfrm>
+          <a:prstGeom prst="rect">
+            <a:avLst/>
+          </a:prstGeom>
+        </p:spPr>
+      </p:pic>
+      <p:pic>
+        <p:nvPicPr>
+          <p:cNvPr id="10" name="Picture 9">
+            <a:extLst>
+              <a:ext uri="{FF2B5EF4-FFF2-40B4-BE49-F238E27FC236}">
+                <a16:creationId xmlns:a16="http://schemas.microsoft.com/office/drawing/2014/main" id="{0DFF0E3F-A0CC-9F40-8FC0-00E6C5549CB6}"/>
+              </a:ext>
+            </a:extLst>
+          </p:cNvPr>
+          <p:cNvPicPr>
+            <a:picLocks noChangeAspect="1"/>
+          </p:cNvPicPr>
+          <p:nvPr/>
+        </p:nvPicPr>
+        <p:blipFill>
+          <a:blip r:embed="rId5"/>
+          <a:stretch>
+            <a:fillRect/>
+          </a:stretch>
+        </p:blipFill>
+        <p:spPr>
+          <a:xfrm>
+            <a:off x="495107" y="2993865"/>
+            <a:ext cx="2919661" cy="1980000"/>
+          </a:xfrm>
+          <a:prstGeom prst="rect">
+            <a:avLst/>
+          </a:prstGeom>
+        </p:spPr>
+      </p:pic>
+      <p:pic>
+        <p:nvPicPr>
+          <p:cNvPr id="14" name="Picture 13" descr="A screenshot of a cell phone&#10;&#10;Description automatically generated">
+            <a:extLst>
+              <a:ext uri="{FF2B5EF4-FFF2-40B4-BE49-F238E27FC236}">
+                <a16:creationId xmlns:a16="http://schemas.microsoft.com/office/drawing/2014/main" id="{F0403125-5201-BE49-A40B-D4815DF86B4A}"/>
+              </a:ext>
+            </a:extLst>
+          </p:cNvPr>
+          <p:cNvPicPr>
+            <a:picLocks noChangeAspect="1"/>
+          </p:cNvPicPr>
+          <p:nvPr/>
+        </p:nvPicPr>
+        <p:blipFill>
+          <a:blip r:embed="rId6"/>
+          <a:stretch>
+            <a:fillRect/>
+          </a:stretch>
+        </p:blipFill>
+        <p:spPr>
+          <a:xfrm>
+            <a:off x="3709240" y="2987750"/>
+            <a:ext cx="2919661" cy="1980000"/>
+          </a:xfrm>
+          <a:prstGeom prst="rect">
+            <a:avLst/>
+          </a:prstGeom>
+        </p:spPr>
+      </p:pic>
+      <p:sp>
+        <p:nvSpPr>
+          <p:cNvPr id="15" name="TextBox 14">
+            <a:extLst>
+              <a:ext uri="{FF2B5EF4-FFF2-40B4-BE49-F238E27FC236}">
+                <a16:creationId xmlns:a16="http://schemas.microsoft.com/office/drawing/2014/main" id="{ADD45AD7-6332-9C47-A13C-94FEDFBB7C18}"/>
+              </a:ext>
+            </a:extLst>
+          </p:cNvPr>
+          <p:cNvSpPr txBox="1"/>
+          <p:nvPr/>
+        </p:nvSpPr>
+        <p:spPr>
+          <a:xfrm>
+            <a:off x="6790414" y="1701241"/>
+            <a:ext cx="2057400" cy="2308324"/>
+          </a:xfrm>
+          <a:prstGeom prst="rect">
+            <a:avLst/>
+          </a:prstGeom>
+          <a:noFill/>
+        </p:spPr>
+        <p:txBody>
+          <a:bodyPr wrap="square" rtlCol="0">
+            <a:spAutoFit/>
+          </a:bodyPr>
+          <a:lstStyle/>
+          <a:p>
+            <a:pPr marL="285750" indent="-285750">
+              <a:buFont typeface="Arial" panose="020B0604020202020204" pitchFamily="34" charset="0"/>
+              <a:buChar char="•"/>
+            </a:pPr>
             <a:r>
               <a:rPr lang="en-US" dirty="0"/>
-              <a:t>Is this telling me that the average fluctuation is around 40% (from the standard deviations)?</a:t>
+              <a:t>Showed this an Elba but never in this meeting… </a:t>
+            </a:r>
+          </a:p>
+          <a:p>
+            <a:pPr marL="285750" indent="-285750">
+              <a:buFont typeface="Arial" panose="020B0604020202020204" pitchFamily="34" charset="0"/>
+              <a:buChar char="•"/>
+            </a:pPr>
+            <a:endParaRPr lang="en-US" dirty="0"/>
+          </a:p>
+          <a:p>
+            <a:pPr marL="285750" indent="-285750">
+              <a:buFont typeface="Arial" panose="020B0604020202020204" pitchFamily="34" charset="0"/>
+              <a:buChar char="•"/>
+            </a:pPr>
+            <a:r>
+              <a:rPr lang="en-US" dirty="0"/>
+              <a:t>With quality cuts all crystals lie within 3 sigma, which is good!</a:t>
+            </a:r>
+          </a:p>
+        </p:txBody>
+      </p:sp>
+    </p:spTree>
+    <p:extLst>
+      <p:ext uri="{BB962C8B-B14F-4D97-AF65-F5344CB8AC3E}">
+        <p14:creationId xmlns:p14="http://schemas.microsoft.com/office/powerpoint/2010/main" val="2167622201"/>
+      </p:ext>
+    </p:extLst>
+  </p:cSld>
+  <p:clrMapOvr>
+    <a:masterClrMapping/>
+  </p:clrMapOvr>
+</p:sld>
+</file>
+
+<file path=ppt/slides/slide6.xml><?xml version="1.0" encoding="utf-8"?>
+<p:sld xmlns:a="http://schemas.openxmlformats.org/drawingml/2006/main" xmlns:r="http://schemas.openxmlformats.org/officeDocument/2006/relationships" xmlns:p="http://schemas.openxmlformats.org/presentationml/2006/main">
+  <p:cSld>
+    <p:spTree>
+      <p:nvGrpSpPr>
+        <p:cNvPr id="1" name=""/>
+        <p:cNvGrpSpPr/>
+        <p:nvPr/>
+      </p:nvGrpSpPr>
+      <p:grpSpPr>
+        <a:xfrm>
+          <a:off x="0" y="0"/>
+          <a:ext cx="0" cy="0"/>
+          <a:chOff x="0" y="0"/>
+          <a:chExt cx="0" cy="0"/>
+        </a:xfrm>
+      </p:grpSpPr>
+      <p:sp>
+        <p:nvSpPr>
+          <p:cNvPr id="3" name="Text Placeholder 2">
+            <a:extLst>
+              <a:ext uri="{FF2B5EF4-FFF2-40B4-BE49-F238E27FC236}">
+                <a16:creationId xmlns:a16="http://schemas.microsoft.com/office/drawing/2014/main" id="{3246EBD4-CBB2-7F47-9287-D089A60762FC}"/>
+              </a:ext>
+            </a:extLst>
+          </p:cNvPr>
+          <p:cNvSpPr>
+            <a:spLocks noGrp="1"/>
+          </p:cNvSpPr>
+          <p:nvPr>
+            <p:ph type="body" sz="half" idx="4294967295"/>
+          </p:nvPr>
+        </p:nvSpPr>
+        <p:spPr>
+          <a:xfrm>
+            <a:off x="200633" y="887767"/>
+            <a:ext cx="3820930" cy="3033983"/>
+          </a:xfrm>
+          <a:prstGeom prst="rect">
+            <a:avLst/>
+          </a:prstGeom>
+        </p:spPr>
+        <p:txBody>
+          <a:bodyPr>
+            <a:normAutofit/>
+          </a:bodyPr>
+          <a:lstStyle/>
+          <a:p>
+            <a:pPr marL="0" indent="0">
+              <a:buNone/>
+            </a:pPr>
+            <a:endParaRPr lang="en-US" sz="2400" b="0" dirty="0"/>
+          </a:p>
+          <a:p>
+            <a:pPr marL="0" lvl="1" indent="0">
+              <a:buNone/>
+            </a:pPr>
+            <a:endParaRPr lang="en-US" sz="2000" b="0" dirty="0"/>
+          </a:p>
+          <a:p>
+            <a:pPr marL="457200" lvl="3" indent="-457200">
+              <a:buFont typeface="+mj-lt"/>
+              <a:buAutoNum type="arabicPeriod"/>
+            </a:pPr>
+            <a:endParaRPr lang="en-US" sz="800" b="0" dirty="0"/>
+          </a:p>
+          <a:p>
+            <a:pPr marL="457200" indent="-457200">
+              <a:buFont typeface="+mj-lt"/>
+              <a:buAutoNum type="arabicPeriod"/>
+            </a:pPr>
+            <a:endParaRPr lang="en-US" sz="2400" b="0" dirty="0"/>
+          </a:p>
+          <a:p>
+            <a:pPr marL="0" indent="0">
+              <a:buNone/>
+            </a:pPr>
+            <a:endParaRPr lang="en-US" sz="2400" b="0" dirty="0"/>
+          </a:p>
+          <a:p>
+            <a:pPr marL="342900" indent="-342900">
+              <a:buFont typeface="+mj-lt"/>
+              <a:buAutoNum type="arabicPeriod"/>
+            </a:pPr>
+            <a:endParaRPr lang="en-US" sz="2400" b="0" dirty="0">
+              <a:solidFill>
+                <a:schemeClr val="tx1"/>
+              </a:solidFill>
+            </a:endParaRPr>
+          </a:p>
+          <a:p>
+            <a:pPr marL="342900" indent="-342900">
+              <a:buFont typeface="+mj-lt"/>
+              <a:buAutoNum type="arabicPeriod"/>
+            </a:pPr>
+            <a:endParaRPr lang="en-US" sz="2400" b="0" dirty="0">
+              <a:solidFill>
+                <a:schemeClr val="tx1"/>
+              </a:solidFill>
+            </a:endParaRPr>
+          </a:p>
+        </p:txBody>
+      </p:sp>
+      <p:sp>
+        <p:nvSpPr>
+          <p:cNvPr id="8" name="Slide Number Placeholder 7">
+            <a:extLst>
+              <a:ext uri="{FF2B5EF4-FFF2-40B4-BE49-F238E27FC236}">
+                <a16:creationId xmlns:a16="http://schemas.microsoft.com/office/drawing/2014/main" id="{76C5416C-9739-2F46-98DD-0F89AF48D533}"/>
+              </a:ext>
+            </a:extLst>
+          </p:cNvPr>
+          <p:cNvSpPr>
+            <a:spLocks noGrp="1"/>
+          </p:cNvSpPr>
+          <p:nvPr>
+            <p:ph type="sldNum" sz="quarter" idx="10"/>
+          </p:nvPr>
+        </p:nvSpPr>
+        <p:spPr/>
+        <p:txBody>
+          <a:bodyPr/>
+          <a:lstStyle/>
+          <a:p>
+            <a:fld id="{7C6B53F1-911B-F745-BD66-11EC17F59F6C}" type="slidenum">
+              <a:rPr lang="en-US" smtClean="0"/>
+              <a:t>5</a:t>
+            </a:fld>
+            <a:endParaRPr lang="en-US"/>
+          </a:p>
+        </p:txBody>
+      </p:sp>
+      <p:sp>
+        <p:nvSpPr>
+          <p:cNvPr id="5" name="TextBox 4">
+            <a:extLst>
+              <a:ext uri="{FF2B5EF4-FFF2-40B4-BE49-F238E27FC236}">
+                <a16:creationId xmlns:a16="http://schemas.microsoft.com/office/drawing/2014/main" id="{C899410A-2CA5-3748-84F0-0DBA652E49DA}"/>
+              </a:ext>
+            </a:extLst>
+          </p:cNvPr>
+          <p:cNvSpPr txBox="1"/>
+          <p:nvPr/>
+        </p:nvSpPr>
+        <p:spPr>
+          <a:xfrm>
+            <a:off x="1324885" y="122000"/>
+            <a:ext cx="6494229" cy="461665"/>
+          </a:xfrm>
+          <a:prstGeom prst="rect">
+            <a:avLst/>
+          </a:prstGeom>
+          <a:noFill/>
+        </p:spPr>
+        <p:txBody>
+          <a:bodyPr wrap="square" rtlCol="0">
+            <a:spAutoFit/>
+          </a:bodyPr>
+          <a:lstStyle/>
+          <a:p>
+            <a:pPr algn="ctr"/>
+            <a:r>
+              <a:rPr lang="en-US" sz="2400" b="1" dirty="0">
+                <a:solidFill>
+                  <a:schemeClr val="bg1"/>
+                </a:solidFill>
+              </a:rPr>
+              <a:t>Fractional Shift</a:t>
+            </a:r>
+          </a:p>
+        </p:txBody>
+      </p:sp>
+      <p:pic>
+        <p:nvPicPr>
+          <p:cNvPr id="6" name="Picture 5" descr="A screenshot of a cell phone&#10;&#10;Description automatically generated">
+            <a:extLst>
+              <a:ext uri="{FF2B5EF4-FFF2-40B4-BE49-F238E27FC236}">
+                <a16:creationId xmlns:a16="http://schemas.microsoft.com/office/drawing/2014/main" id="{F9A2E611-8870-CE40-90D3-43912D4A3F0B}"/>
+              </a:ext>
+            </a:extLst>
+          </p:cNvPr>
+          <p:cNvPicPr>
+            <a:picLocks noChangeAspect="1"/>
+          </p:cNvPicPr>
+          <p:nvPr/>
+        </p:nvPicPr>
+        <p:blipFill>
+          <a:blip r:embed="rId3"/>
+          <a:stretch>
+            <a:fillRect/>
+          </a:stretch>
+        </p:blipFill>
+        <p:spPr>
+          <a:xfrm>
+            <a:off x="651266" y="982414"/>
+            <a:ext cx="2919661" cy="1980000"/>
+          </a:xfrm>
+          <a:prstGeom prst="rect">
+            <a:avLst/>
+          </a:prstGeom>
+        </p:spPr>
+      </p:pic>
+      <p:pic>
+        <p:nvPicPr>
+          <p:cNvPr id="9" name="Picture 8" descr="A screenshot of a cell phone&#10;&#10;Description automatically generated">
+            <a:extLst>
+              <a:ext uri="{FF2B5EF4-FFF2-40B4-BE49-F238E27FC236}">
+                <a16:creationId xmlns:a16="http://schemas.microsoft.com/office/drawing/2014/main" id="{6AA8F6A4-AAC4-D443-9CA1-0F5A37451BD4}"/>
+              </a:ext>
+            </a:extLst>
+          </p:cNvPr>
+          <p:cNvPicPr>
+            <a:picLocks noChangeAspect="1"/>
+          </p:cNvPicPr>
+          <p:nvPr/>
+        </p:nvPicPr>
+        <p:blipFill>
+          <a:blip r:embed="rId4"/>
+          <a:stretch>
+            <a:fillRect/>
+          </a:stretch>
+        </p:blipFill>
+        <p:spPr>
+          <a:xfrm>
+            <a:off x="651267" y="3057061"/>
+            <a:ext cx="2919661" cy="1980000"/>
+          </a:xfrm>
+          <a:prstGeom prst="rect">
+            <a:avLst/>
+          </a:prstGeom>
+        </p:spPr>
+      </p:pic>
+      <p:pic>
+        <p:nvPicPr>
+          <p:cNvPr id="11" name="Picture 10" descr="A screenshot of a cell phone&#10;&#10;Description automatically generated">
+            <a:extLst>
+              <a:ext uri="{FF2B5EF4-FFF2-40B4-BE49-F238E27FC236}">
+                <a16:creationId xmlns:a16="http://schemas.microsoft.com/office/drawing/2014/main" id="{54296DCA-F0DE-FE4B-BAD0-3A4BDBFE95CD}"/>
+              </a:ext>
+            </a:extLst>
+          </p:cNvPr>
+          <p:cNvPicPr>
+            <a:picLocks noChangeAspect="1"/>
+          </p:cNvPicPr>
+          <p:nvPr/>
+        </p:nvPicPr>
+        <p:blipFill>
+          <a:blip r:embed="rId5"/>
+          <a:stretch>
+            <a:fillRect/>
+          </a:stretch>
+        </p:blipFill>
+        <p:spPr>
+          <a:xfrm>
+            <a:off x="3662608" y="982414"/>
+            <a:ext cx="2919661" cy="1980000"/>
+          </a:xfrm>
+          <a:prstGeom prst="rect">
+            <a:avLst/>
+          </a:prstGeom>
+        </p:spPr>
+      </p:pic>
+      <p:pic>
+        <p:nvPicPr>
+          <p:cNvPr id="13" name="Picture 12" descr="A screenshot of a cell phone&#10;&#10;Description automatically generated">
+            <a:extLst>
+              <a:ext uri="{FF2B5EF4-FFF2-40B4-BE49-F238E27FC236}">
+                <a16:creationId xmlns:a16="http://schemas.microsoft.com/office/drawing/2014/main" id="{6BEFFA8A-2E83-5B49-B96D-57A53DD5D6ED}"/>
+              </a:ext>
+            </a:extLst>
+          </p:cNvPr>
+          <p:cNvPicPr>
+            <a:picLocks noChangeAspect="1"/>
+          </p:cNvPicPr>
+          <p:nvPr/>
+        </p:nvPicPr>
+        <p:blipFill>
+          <a:blip r:embed="rId6"/>
+          <a:stretch>
+            <a:fillRect/>
+          </a:stretch>
+        </p:blipFill>
+        <p:spPr>
+          <a:xfrm>
+            <a:off x="3662608" y="3109176"/>
+            <a:ext cx="2919661" cy="1980000"/>
+          </a:xfrm>
+          <a:prstGeom prst="rect">
+            <a:avLst/>
+          </a:prstGeom>
+        </p:spPr>
+      </p:pic>
+      <p:sp>
+        <p:nvSpPr>
+          <p:cNvPr id="14" name="TextBox 13">
+            <a:extLst>
+              <a:ext uri="{FF2B5EF4-FFF2-40B4-BE49-F238E27FC236}">
+                <a16:creationId xmlns:a16="http://schemas.microsoft.com/office/drawing/2014/main" id="{2453E631-9D66-954F-A1AE-996C44D5705D}"/>
+              </a:ext>
+            </a:extLst>
+          </p:cNvPr>
+          <p:cNvSpPr txBox="1"/>
+          <p:nvPr/>
+        </p:nvSpPr>
+        <p:spPr>
+          <a:xfrm>
+            <a:off x="6493897" y="1790852"/>
+            <a:ext cx="2650434" cy="2585323"/>
+          </a:xfrm>
+          <a:prstGeom prst="rect">
+            <a:avLst/>
+          </a:prstGeom>
+          <a:noFill/>
+        </p:spPr>
+        <p:txBody>
+          <a:bodyPr wrap="square" rtlCol="0">
+            <a:spAutoFit/>
+          </a:bodyPr>
+          <a:lstStyle/>
+          <a:p>
+            <a:pPr marL="285750" indent="-285750">
+              <a:buFont typeface="Arial" panose="020B0604020202020204" pitchFamily="34" charset="0"/>
+              <a:buChar char="•"/>
+            </a:pPr>
+            <a:r>
+              <a:rPr lang="en-US" b="1" dirty="0"/>
+              <a:t>I had to require that the error &lt; 2 to remove outliers (mostly).</a:t>
+            </a:r>
+          </a:p>
+          <a:p>
+            <a:pPr marL="285750" indent="-285750">
+              <a:buFont typeface="Arial" panose="020B0604020202020204" pitchFamily="34" charset="0"/>
+              <a:buChar char="•"/>
+            </a:pPr>
+            <a:endParaRPr lang="en-US" dirty="0"/>
+          </a:p>
+          <a:p>
+            <a:pPr marL="285750" indent="-285750">
+              <a:buFont typeface="Arial" panose="020B0604020202020204" pitchFamily="34" charset="0"/>
+              <a:buChar char="•"/>
+            </a:pPr>
+            <a:r>
+              <a:rPr lang="en-US" dirty="0"/>
+              <a:t>The fractional shift equation does not account for uncertainties…</a:t>
             </a:r>
           </a:p>
         </p:txBody>
@@ -4344,6 +5835,935 @@
     <p:extLst>
       <p:ext uri="{BB962C8B-B14F-4D97-AF65-F5344CB8AC3E}">
         <p14:creationId xmlns:p14="http://schemas.microsoft.com/office/powerpoint/2010/main" val="4068550443"/>
+      </p:ext>
+    </p:extLst>
+  </p:cSld>
+  <p:clrMapOvr>
+    <a:masterClrMapping/>
+  </p:clrMapOvr>
+</p:sld>
+</file>
+
+<file path=ppt/slides/slide7.xml><?xml version="1.0" encoding="utf-8"?>
+<p:sld xmlns:a="http://schemas.openxmlformats.org/drawingml/2006/main" xmlns:r="http://schemas.openxmlformats.org/officeDocument/2006/relationships" xmlns:p="http://schemas.openxmlformats.org/presentationml/2006/main">
+  <p:cSld>
+    <p:spTree>
+      <p:nvGrpSpPr>
+        <p:cNvPr id="1" name=""/>
+        <p:cNvGrpSpPr/>
+        <p:nvPr/>
+      </p:nvGrpSpPr>
+      <p:grpSpPr>
+        <a:xfrm>
+          <a:off x="0" y="0"/>
+          <a:ext cx="0" cy="0"/>
+          <a:chOff x="0" y="0"/>
+          <a:chExt cx="0" cy="0"/>
+        </a:xfrm>
+      </p:grpSpPr>
+      <p:sp>
+        <p:nvSpPr>
+          <p:cNvPr id="3" name="Text Placeholder 2">
+            <a:extLst>
+              <a:ext uri="{FF2B5EF4-FFF2-40B4-BE49-F238E27FC236}">
+                <a16:creationId xmlns:a16="http://schemas.microsoft.com/office/drawing/2014/main" id="{3246EBD4-CBB2-7F47-9287-D089A60762FC}"/>
+              </a:ext>
+            </a:extLst>
+          </p:cNvPr>
+          <p:cNvSpPr>
+            <a:spLocks noGrp="1"/>
+          </p:cNvSpPr>
+          <p:nvPr>
+            <p:ph type="body" sz="half" idx="4294967295"/>
+          </p:nvPr>
+        </p:nvSpPr>
+        <p:spPr>
+          <a:xfrm>
+            <a:off x="200633" y="887767"/>
+            <a:ext cx="3820930" cy="3033983"/>
+          </a:xfrm>
+          <a:prstGeom prst="rect">
+            <a:avLst/>
+          </a:prstGeom>
+        </p:spPr>
+        <p:txBody>
+          <a:bodyPr>
+            <a:normAutofit/>
+          </a:bodyPr>
+          <a:lstStyle/>
+          <a:p>
+            <a:pPr marL="0" indent="0">
+              <a:buNone/>
+            </a:pPr>
+            <a:endParaRPr lang="en-US" sz="2400" b="0" dirty="0"/>
+          </a:p>
+          <a:p>
+            <a:pPr marL="0" lvl="1" indent="0">
+              <a:buNone/>
+            </a:pPr>
+            <a:endParaRPr lang="en-US" sz="2000" b="0" dirty="0"/>
+          </a:p>
+          <a:p>
+            <a:pPr marL="457200" lvl="3" indent="-457200">
+              <a:buFont typeface="+mj-lt"/>
+              <a:buAutoNum type="arabicPeriod"/>
+            </a:pPr>
+            <a:endParaRPr lang="en-US" sz="800" b="0" dirty="0"/>
+          </a:p>
+          <a:p>
+            <a:pPr marL="457200" indent="-457200">
+              <a:buFont typeface="+mj-lt"/>
+              <a:buAutoNum type="arabicPeriod"/>
+            </a:pPr>
+            <a:endParaRPr lang="en-US" sz="2400" b="0" dirty="0"/>
+          </a:p>
+          <a:p>
+            <a:pPr marL="0" indent="0">
+              <a:buNone/>
+            </a:pPr>
+            <a:endParaRPr lang="en-US" sz="2400" b="0" dirty="0"/>
+          </a:p>
+          <a:p>
+            <a:pPr marL="342900" indent="-342900">
+              <a:buFont typeface="+mj-lt"/>
+              <a:buAutoNum type="arabicPeriod"/>
+            </a:pPr>
+            <a:endParaRPr lang="en-US" sz="2400" b="0" dirty="0">
+              <a:solidFill>
+                <a:schemeClr val="tx1"/>
+              </a:solidFill>
+            </a:endParaRPr>
+          </a:p>
+          <a:p>
+            <a:pPr marL="342900" indent="-342900">
+              <a:buFont typeface="+mj-lt"/>
+              <a:buAutoNum type="arabicPeriod"/>
+            </a:pPr>
+            <a:endParaRPr lang="en-US" sz="2400" b="0" dirty="0">
+              <a:solidFill>
+                <a:schemeClr val="tx1"/>
+              </a:solidFill>
+            </a:endParaRPr>
+          </a:p>
+        </p:txBody>
+      </p:sp>
+      <p:sp>
+        <p:nvSpPr>
+          <p:cNvPr id="8" name="Slide Number Placeholder 7">
+            <a:extLst>
+              <a:ext uri="{FF2B5EF4-FFF2-40B4-BE49-F238E27FC236}">
+                <a16:creationId xmlns:a16="http://schemas.microsoft.com/office/drawing/2014/main" id="{76C5416C-9739-2F46-98DD-0F89AF48D533}"/>
+              </a:ext>
+            </a:extLst>
+          </p:cNvPr>
+          <p:cNvSpPr>
+            <a:spLocks noGrp="1"/>
+          </p:cNvSpPr>
+          <p:nvPr>
+            <p:ph type="sldNum" sz="quarter" idx="10"/>
+          </p:nvPr>
+        </p:nvSpPr>
+        <p:spPr/>
+        <p:txBody>
+          <a:bodyPr/>
+          <a:lstStyle/>
+          <a:p>
+            <a:fld id="{7C6B53F1-911B-F745-BD66-11EC17F59F6C}" type="slidenum">
+              <a:rPr lang="en-US" smtClean="0"/>
+              <a:t>6</a:t>
+            </a:fld>
+            <a:endParaRPr lang="en-US"/>
+          </a:p>
+        </p:txBody>
+      </p:sp>
+      <p:sp>
+        <p:nvSpPr>
+          <p:cNvPr id="5" name="TextBox 4">
+            <a:extLst>
+              <a:ext uri="{FF2B5EF4-FFF2-40B4-BE49-F238E27FC236}">
+                <a16:creationId xmlns:a16="http://schemas.microsoft.com/office/drawing/2014/main" id="{C899410A-2CA5-3748-84F0-0DBA652E49DA}"/>
+              </a:ext>
+            </a:extLst>
+          </p:cNvPr>
+          <p:cNvSpPr txBox="1"/>
+          <p:nvPr/>
+        </p:nvSpPr>
+        <p:spPr>
+          <a:xfrm>
+            <a:off x="1324885" y="122000"/>
+            <a:ext cx="6494229" cy="461665"/>
+          </a:xfrm>
+          <a:prstGeom prst="rect">
+            <a:avLst/>
+          </a:prstGeom>
+          <a:noFill/>
+        </p:spPr>
+        <p:txBody>
+          <a:bodyPr wrap="square" rtlCol="0">
+            <a:spAutoFit/>
+          </a:bodyPr>
+          <a:lstStyle/>
+          <a:p>
+            <a:pPr algn="ctr"/>
+            <a:r>
+              <a:rPr lang="en-US" sz="2400" b="1" dirty="0">
+                <a:solidFill>
+                  <a:schemeClr val="bg1"/>
+                </a:solidFill>
+              </a:rPr>
+              <a:t>Fractional Shift</a:t>
+            </a:r>
+          </a:p>
+        </p:txBody>
+      </p:sp>
+      <p:pic>
+        <p:nvPicPr>
+          <p:cNvPr id="4" name="Picture 3" descr="A screenshot of a cell phone&#10;&#10;Description automatically generated">
+            <a:extLst>
+              <a:ext uri="{FF2B5EF4-FFF2-40B4-BE49-F238E27FC236}">
+                <a16:creationId xmlns:a16="http://schemas.microsoft.com/office/drawing/2014/main" id="{A1C1C2D3-8859-8D48-A06F-C4575CE255BC}"/>
+              </a:ext>
+            </a:extLst>
+          </p:cNvPr>
+          <p:cNvPicPr>
+            <a:picLocks noChangeAspect="1"/>
+          </p:cNvPicPr>
+          <p:nvPr/>
+        </p:nvPicPr>
+        <p:blipFill>
+          <a:blip r:embed="rId3"/>
+          <a:stretch>
+            <a:fillRect/>
+          </a:stretch>
+        </p:blipFill>
+        <p:spPr>
+          <a:xfrm>
+            <a:off x="201932" y="1129813"/>
+            <a:ext cx="4419600" cy="2997200"/>
+          </a:xfrm>
+          <a:prstGeom prst="rect">
+            <a:avLst/>
+          </a:prstGeom>
+        </p:spPr>
+      </p:pic>
+      <p:pic>
+        <p:nvPicPr>
+          <p:cNvPr id="10" name="Picture 9" descr="A screenshot of a cell phone&#10;&#10;Description automatically generated">
+            <a:extLst>
+              <a:ext uri="{FF2B5EF4-FFF2-40B4-BE49-F238E27FC236}">
+                <a16:creationId xmlns:a16="http://schemas.microsoft.com/office/drawing/2014/main" id="{1547B385-8EBD-F743-8F60-64B1DDFFA8E9}"/>
+              </a:ext>
+            </a:extLst>
+          </p:cNvPr>
+          <p:cNvPicPr>
+            <a:picLocks noChangeAspect="1"/>
+          </p:cNvPicPr>
+          <p:nvPr/>
+        </p:nvPicPr>
+        <p:blipFill>
+          <a:blip r:embed="rId4"/>
+          <a:stretch>
+            <a:fillRect/>
+          </a:stretch>
+        </p:blipFill>
+        <p:spPr>
+          <a:xfrm>
+            <a:off x="4621532" y="1129813"/>
+            <a:ext cx="4419600" cy="2997200"/>
+          </a:xfrm>
+          <a:prstGeom prst="rect">
+            <a:avLst/>
+          </a:prstGeom>
+        </p:spPr>
+      </p:pic>
+      <p:cxnSp>
+        <p:nvCxnSpPr>
+          <p:cNvPr id="15" name="Straight Arrow Connector 14">
+            <a:extLst>
+              <a:ext uri="{FF2B5EF4-FFF2-40B4-BE49-F238E27FC236}">
+                <a16:creationId xmlns:a16="http://schemas.microsoft.com/office/drawing/2014/main" id="{D311CA85-27F0-F04C-9F82-49298A23E6FC}"/>
+              </a:ext>
+            </a:extLst>
+          </p:cNvPr>
+          <p:cNvCxnSpPr>
+            <a:cxnSpLocks/>
+          </p:cNvCxnSpPr>
+          <p:nvPr/>
+        </p:nvCxnSpPr>
+        <p:spPr>
+          <a:xfrm flipH="1">
+            <a:off x="5459896" y="2628413"/>
+            <a:ext cx="278295" cy="936422"/>
+          </a:xfrm>
+          <a:prstGeom prst="straightConnector1">
+            <a:avLst/>
+          </a:prstGeom>
+          <a:ln>
+            <a:tailEnd type="triangle"/>
+          </a:ln>
+        </p:spPr>
+        <p:style>
+          <a:lnRef idx="1">
+            <a:schemeClr val="accent1"/>
+          </a:lnRef>
+          <a:fillRef idx="0">
+            <a:schemeClr val="accent1"/>
+          </a:fillRef>
+          <a:effectRef idx="0">
+            <a:schemeClr val="accent1"/>
+          </a:effectRef>
+          <a:fontRef idx="minor">
+            <a:schemeClr val="tx1"/>
+          </a:fontRef>
+        </p:style>
+      </p:cxnSp>
+      <p:sp>
+        <p:nvSpPr>
+          <p:cNvPr id="17" name="TextBox 16">
+            <a:extLst>
+              <a:ext uri="{FF2B5EF4-FFF2-40B4-BE49-F238E27FC236}">
+                <a16:creationId xmlns:a16="http://schemas.microsoft.com/office/drawing/2014/main" id="{1DB0AF42-815D-6B43-ADE8-DBB1845F1B2D}"/>
+              </a:ext>
+            </a:extLst>
+          </p:cNvPr>
+          <p:cNvSpPr txBox="1"/>
+          <p:nvPr/>
+        </p:nvSpPr>
+        <p:spPr>
+          <a:xfrm>
+            <a:off x="5459896" y="2189314"/>
+            <a:ext cx="1152795" cy="430887"/>
+          </a:xfrm>
+          <a:prstGeom prst="rect">
+            <a:avLst/>
+          </a:prstGeom>
+          <a:noFill/>
+        </p:spPr>
+        <p:txBody>
+          <a:bodyPr wrap="square" rtlCol="0">
+            <a:spAutoFit/>
+          </a:bodyPr>
+          <a:lstStyle/>
+          <a:p>
+            <a:r>
+              <a:rPr lang="en-US" sz="1100" dirty="0"/>
+              <a:t>Outlier, </a:t>
+            </a:r>
+            <a:r>
+              <a:rPr lang="en-US" sz="1100" dirty="0" err="1"/>
+              <a:t>xtal</a:t>
+            </a:r>
+            <a:r>
+              <a:rPr lang="en-US" sz="1100" dirty="0"/>
+              <a:t> 23 </a:t>
+            </a:r>
+            <a:r>
+              <a:rPr lang="en-US" sz="1100" dirty="0" err="1"/>
+              <a:t>calo</a:t>
+            </a:r>
+            <a:r>
+              <a:rPr lang="en-US" sz="1100" dirty="0"/>
+              <a:t> 13</a:t>
+            </a:r>
+          </a:p>
+        </p:txBody>
+      </p:sp>
+      <p:sp>
+        <p:nvSpPr>
+          <p:cNvPr id="18" name="TextBox 17">
+            <a:extLst>
+              <a:ext uri="{FF2B5EF4-FFF2-40B4-BE49-F238E27FC236}">
+                <a16:creationId xmlns:a16="http://schemas.microsoft.com/office/drawing/2014/main" id="{ECF90BBA-5DD6-4042-8237-5901278F8F31}"/>
+              </a:ext>
+            </a:extLst>
+          </p:cNvPr>
+          <p:cNvSpPr txBox="1"/>
+          <p:nvPr/>
+        </p:nvSpPr>
+        <p:spPr>
+          <a:xfrm>
+            <a:off x="636103" y="4255738"/>
+            <a:ext cx="7871791" cy="646331"/>
+          </a:xfrm>
+          <a:prstGeom prst="rect">
+            <a:avLst/>
+          </a:prstGeom>
+          <a:noFill/>
+        </p:spPr>
+        <p:txBody>
+          <a:bodyPr wrap="square" rtlCol="0">
+            <a:spAutoFit/>
+          </a:bodyPr>
+          <a:lstStyle/>
+          <a:p>
+            <a:r>
+              <a:rPr lang="en-US" dirty="0"/>
+              <a:t>It looks like the fractional shift is around 30-40% looking at the standard deviation, but I still need to settle on how to clean up the outliers. </a:t>
+            </a:r>
+          </a:p>
+        </p:txBody>
+      </p:sp>
+    </p:spTree>
+    <p:extLst>
+      <p:ext uri="{BB962C8B-B14F-4D97-AF65-F5344CB8AC3E}">
+        <p14:creationId xmlns:p14="http://schemas.microsoft.com/office/powerpoint/2010/main" val="1901349765"/>
+      </p:ext>
+    </p:extLst>
+  </p:cSld>
+  <p:clrMapOvr>
+    <a:masterClrMapping/>
+  </p:clrMapOvr>
+</p:sld>
+</file>
+
+<file path=ppt/slides/slide8.xml><?xml version="1.0" encoding="utf-8"?>
+<p:sld xmlns:a="http://schemas.openxmlformats.org/drawingml/2006/main" xmlns:r="http://schemas.openxmlformats.org/officeDocument/2006/relationships" xmlns:p="http://schemas.openxmlformats.org/presentationml/2006/main">
+  <p:cSld>
+    <p:spTree>
+      <p:nvGrpSpPr>
+        <p:cNvPr id="1" name=""/>
+        <p:cNvGrpSpPr/>
+        <p:nvPr/>
+      </p:nvGrpSpPr>
+      <p:grpSpPr>
+        <a:xfrm>
+          <a:off x="0" y="0"/>
+          <a:ext cx="0" cy="0"/>
+          <a:chOff x="0" y="0"/>
+          <a:chExt cx="0" cy="0"/>
+        </a:xfrm>
+      </p:grpSpPr>
+      <p:sp>
+        <p:nvSpPr>
+          <p:cNvPr id="3" name="Text Placeholder 2">
+            <a:extLst>
+              <a:ext uri="{FF2B5EF4-FFF2-40B4-BE49-F238E27FC236}">
+                <a16:creationId xmlns:a16="http://schemas.microsoft.com/office/drawing/2014/main" id="{3246EBD4-CBB2-7F47-9287-D089A60762FC}"/>
+              </a:ext>
+            </a:extLst>
+          </p:cNvPr>
+          <p:cNvSpPr>
+            <a:spLocks noGrp="1"/>
+          </p:cNvSpPr>
+          <p:nvPr>
+            <p:ph type="body" sz="half" idx="4294967295"/>
+          </p:nvPr>
+        </p:nvSpPr>
+        <p:spPr>
+          <a:xfrm>
+            <a:off x="200633" y="887767"/>
+            <a:ext cx="3820930" cy="3033983"/>
+          </a:xfrm>
+          <a:prstGeom prst="rect">
+            <a:avLst/>
+          </a:prstGeom>
+        </p:spPr>
+        <p:txBody>
+          <a:bodyPr>
+            <a:normAutofit/>
+          </a:bodyPr>
+          <a:lstStyle/>
+          <a:p>
+            <a:pPr marL="0" indent="0">
+              <a:buNone/>
+            </a:pPr>
+            <a:endParaRPr lang="en-US" sz="2400" b="0" dirty="0"/>
+          </a:p>
+          <a:p>
+            <a:pPr marL="0" lvl="1" indent="0">
+              <a:buNone/>
+            </a:pPr>
+            <a:endParaRPr lang="en-US" sz="2000" b="0" dirty="0"/>
+          </a:p>
+          <a:p>
+            <a:pPr marL="457200" lvl="3" indent="-457200">
+              <a:buFont typeface="+mj-lt"/>
+              <a:buAutoNum type="arabicPeriod"/>
+            </a:pPr>
+            <a:endParaRPr lang="en-US" sz="800" b="0" dirty="0"/>
+          </a:p>
+          <a:p>
+            <a:pPr marL="457200" indent="-457200">
+              <a:buFont typeface="+mj-lt"/>
+              <a:buAutoNum type="arabicPeriod"/>
+            </a:pPr>
+            <a:endParaRPr lang="en-US" sz="2400" b="0" dirty="0"/>
+          </a:p>
+          <a:p>
+            <a:pPr marL="0" indent="0">
+              <a:buNone/>
+            </a:pPr>
+            <a:endParaRPr lang="en-US" sz="2400" b="0" dirty="0"/>
+          </a:p>
+          <a:p>
+            <a:pPr marL="342900" indent="-342900">
+              <a:buFont typeface="+mj-lt"/>
+              <a:buAutoNum type="arabicPeriod"/>
+            </a:pPr>
+            <a:endParaRPr lang="en-US" sz="2400" b="0" dirty="0">
+              <a:solidFill>
+                <a:schemeClr val="tx1"/>
+              </a:solidFill>
+            </a:endParaRPr>
+          </a:p>
+          <a:p>
+            <a:pPr marL="342900" indent="-342900">
+              <a:buFont typeface="+mj-lt"/>
+              <a:buAutoNum type="arabicPeriod"/>
+            </a:pPr>
+            <a:endParaRPr lang="en-US" sz="2400" b="0" dirty="0">
+              <a:solidFill>
+                <a:schemeClr val="tx1"/>
+              </a:solidFill>
+            </a:endParaRPr>
+          </a:p>
+        </p:txBody>
+      </p:sp>
+      <p:sp>
+        <p:nvSpPr>
+          <p:cNvPr id="8" name="Slide Number Placeholder 7">
+            <a:extLst>
+              <a:ext uri="{FF2B5EF4-FFF2-40B4-BE49-F238E27FC236}">
+                <a16:creationId xmlns:a16="http://schemas.microsoft.com/office/drawing/2014/main" id="{76C5416C-9739-2F46-98DD-0F89AF48D533}"/>
+              </a:ext>
+            </a:extLst>
+          </p:cNvPr>
+          <p:cNvSpPr>
+            <a:spLocks noGrp="1"/>
+          </p:cNvSpPr>
+          <p:nvPr>
+            <p:ph type="sldNum" sz="quarter" idx="10"/>
+          </p:nvPr>
+        </p:nvSpPr>
+        <p:spPr/>
+        <p:txBody>
+          <a:bodyPr/>
+          <a:lstStyle/>
+          <a:p>
+            <a:fld id="{7C6B53F1-911B-F745-BD66-11EC17F59F6C}" type="slidenum">
+              <a:rPr lang="en-US" smtClean="0"/>
+              <a:t>7</a:t>
+            </a:fld>
+            <a:endParaRPr lang="en-US"/>
+          </a:p>
+        </p:txBody>
+      </p:sp>
+      <p:sp>
+        <p:nvSpPr>
+          <p:cNvPr id="5" name="TextBox 4">
+            <a:extLst>
+              <a:ext uri="{FF2B5EF4-FFF2-40B4-BE49-F238E27FC236}">
+                <a16:creationId xmlns:a16="http://schemas.microsoft.com/office/drawing/2014/main" id="{C899410A-2CA5-3748-84F0-0DBA652E49DA}"/>
+              </a:ext>
+            </a:extLst>
+          </p:cNvPr>
+          <p:cNvSpPr txBox="1"/>
+          <p:nvPr/>
+        </p:nvSpPr>
+        <p:spPr>
+          <a:xfrm>
+            <a:off x="1324885" y="111328"/>
+            <a:ext cx="6494229" cy="461665"/>
+          </a:xfrm>
+          <a:prstGeom prst="rect">
+            <a:avLst/>
+          </a:prstGeom>
+          <a:noFill/>
+        </p:spPr>
+        <p:txBody>
+          <a:bodyPr wrap="square" rtlCol="0">
+            <a:spAutoFit/>
+          </a:bodyPr>
+          <a:lstStyle/>
+          <a:p>
+            <a:pPr algn="ctr"/>
+            <a:r>
+              <a:rPr lang="en-US" sz="2400" b="1" dirty="0">
+                <a:solidFill>
+                  <a:schemeClr val="bg1"/>
+                </a:solidFill>
+              </a:rPr>
+              <a:t>Outlier, </a:t>
+            </a:r>
+            <a:r>
+              <a:rPr lang="en-US" sz="2400" b="1" dirty="0" err="1">
+                <a:solidFill>
+                  <a:schemeClr val="bg1"/>
+                </a:solidFill>
+              </a:rPr>
+              <a:t>xtal</a:t>
+            </a:r>
+            <a:r>
+              <a:rPr lang="en-US" sz="2400" b="1" dirty="0">
+                <a:solidFill>
+                  <a:schemeClr val="bg1"/>
+                </a:solidFill>
+              </a:rPr>
+              <a:t> 23 </a:t>
+            </a:r>
+            <a:r>
+              <a:rPr lang="en-US" sz="2400" b="1" dirty="0" err="1">
+                <a:solidFill>
+                  <a:schemeClr val="bg1"/>
+                </a:solidFill>
+              </a:rPr>
+              <a:t>calo</a:t>
+            </a:r>
+            <a:r>
+              <a:rPr lang="en-US" sz="2400" b="1" dirty="0">
+                <a:solidFill>
+                  <a:schemeClr val="bg1"/>
+                </a:solidFill>
+              </a:rPr>
+              <a:t> 13. </a:t>
+            </a:r>
+          </a:p>
+        </p:txBody>
+      </p:sp>
+      <p:sp>
+        <p:nvSpPr>
+          <p:cNvPr id="17" name="TextBox 16">
+            <a:extLst>
+              <a:ext uri="{FF2B5EF4-FFF2-40B4-BE49-F238E27FC236}">
+                <a16:creationId xmlns:a16="http://schemas.microsoft.com/office/drawing/2014/main" id="{1DB0AF42-815D-6B43-ADE8-DBB1845F1B2D}"/>
+              </a:ext>
+            </a:extLst>
+          </p:cNvPr>
+          <p:cNvSpPr txBox="1"/>
+          <p:nvPr/>
+        </p:nvSpPr>
+        <p:spPr>
+          <a:xfrm>
+            <a:off x="636103" y="887767"/>
+            <a:ext cx="8307264" cy="461665"/>
+          </a:xfrm>
+          <a:prstGeom prst="rect">
+            <a:avLst/>
+          </a:prstGeom>
+          <a:noFill/>
+        </p:spPr>
+        <p:txBody>
+          <a:bodyPr wrap="square" rtlCol="0">
+            <a:spAutoFit/>
+          </a:bodyPr>
+          <a:lstStyle/>
+          <a:p>
+            <a:r>
+              <a:rPr lang="en-US" sz="2400" dirty="0"/>
+              <a:t>Outlier, I can’t motivate a good reason to get rid of this… </a:t>
+            </a:r>
+          </a:p>
+        </p:txBody>
+      </p:sp>
+      <p:pic>
+        <p:nvPicPr>
+          <p:cNvPr id="6" name="Picture 5">
+            <a:extLst>
+              <a:ext uri="{FF2B5EF4-FFF2-40B4-BE49-F238E27FC236}">
+                <a16:creationId xmlns:a16="http://schemas.microsoft.com/office/drawing/2014/main" id="{41BF2919-5D56-8145-ADD9-427537B2B8CB}"/>
+              </a:ext>
+            </a:extLst>
+          </p:cNvPr>
+          <p:cNvPicPr>
+            <a:picLocks noChangeAspect="1"/>
+          </p:cNvPicPr>
+          <p:nvPr/>
+        </p:nvPicPr>
+        <p:blipFill>
+          <a:blip r:embed="rId3"/>
+          <a:stretch>
+            <a:fillRect/>
+          </a:stretch>
+        </p:blipFill>
+        <p:spPr>
+          <a:xfrm rot="5400000">
+            <a:off x="3152342" y="685710"/>
+            <a:ext cx="3274786" cy="5143500"/>
+          </a:xfrm>
+          <a:prstGeom prst="rect">
+            <a:avLst/>
+          </a:prstGeom>
+        </p:spPr>
+      </p:pic>
+    </p:spTree>
+    <p:extLst>
+      <p:ext uri="{BB962C8B-B14F-4D97-AF65-F5344CB8AC3E}">
+        <p14:creationId xmlns:p14="http://schemas.microsoft.com/office/powerpoint/2010/main" val="1554014495"/>
+      </p:ext>
+    </p:extLst>
+  </p:cSld>
+  <p:clrMapOvr>
+    <a:masterClrMapping/>
+  </p:clrMapOvr>
+</p:sld>
+</file>
+
+<file path=ppt/slides/slide9.xml><?xml version="1.0" encoding="utf-8"?>
+<p:sld xmlns:a="http://schemas.openxmlformats.org/drawingml/2006/main" xmlns:r="http://schemas.openxmlformats.org/officeDocument/2006/relationships" xmlns:p="http://schemas.openxmlformats.org/presentationml/2006/main">
+  <p:cSld>
+    <p:spTree>
+      <p:nvGrpSpPr>
+        <p:cNvPr id="1" name=""/>
+        <p:cNvGrpSpPr/>
+        <p:nvPr/>
+      </p:nvGrpSpPr>
+      <p:grpSpPr>
+        <a:xfrm>
+          <a:off x="0" y="0"/>
+          <a:ext cx="0" cy="0"/>
+          <a:chOff x="0" y="0"/>
+          <a:chExt cx="0" cy="0"/>
+        </a:xfrm>
+      </p:grpSpPr>
+      <p:sp>
+        <p:nvSpPr>
+          <p:cNvPr id="3" name="Text Placeholder 2">
+            <a:extLst>
+              <a:ext uri="{FF2B5EF4-FFF2-40B4-BE49-F238E27FC236}">
+                <a16:creationId xmlns:a16="http://schemas.microsoft.com/office/drawing/2014/main" id="{3246EBD4-CBB2-7F47-9287-D089A60762FC}"/>
+              </a:ext>
+            </a:extLst>
+          </p:cNvPr>
+          <p:cNvSpPr>
+            <a:spLocks noGrp="1"/>
+          </p:cNvSpPr>
+          <p:nvPr>
+            <p:ph type="body" sz="half" idx="4294967295"/>
+          </p:nvPr>
+        </p:nvSpPr>
+        <p:spPr>
+          <a:xfrm>
+            <a:off x="200633" y="887767"/>
+            <a:ext cx="3820930" cy="3033983"/>
+          </a:xfrm>
+          <a:prstGeom prst="rect">
+            <a:avLst/>
+          </a:prstGeom>
+        </p:spPr>
+        <p:txBody>
+          <a:bodyPr>
+            <a:normAutofit/>
+          </a:bodyPr>
+          <a:lstStyle/>
+          <a:p>
+            <a:pPr marL="0" indent="0">
+              <a:buNone/>
+            </a:pPr>
+            <a:endParaRPr lang="en-US" sz="2400" b="0" dirty="0"/>
+          </a:p>
+          <a:p>
+            <a:pPr marL="0" lvl="1" indent="0">
+              <a:buNone/>
+            </a:pPr>
+            <a:endParaRPr lang="en-US" sz="2000" b="0" dirty="0"/>
+          </a:p>
+          <a:p>
+            <a:pPr marL="457200" lvl="3" indent="-457200">
+              <a:buFont typeface="+mj-lt"/>
+              <a:buAutoNum type="arabicPeriod"/>
+            </a:pPr>
+            <a:endParaRPr lang="en-US" sz="800" b="0" dirty="0"/>
+          </a:p>
+          <a:p>
+            <a:pPr marL="457200" indent="-457200">
+              <a:buFont typeface="+mj-lt"/>
+              <a:buAutoNum type="arabicPeriod"/>
+            </a:pPr>
+            <a:endParaRPr lang="en-US" sz="2400" b="0" dirty="0"/>
+          </a:p>
+          <a:p>
+            <a:pPr marL="0" indent="0">
+              <a:buNone/>
+            </a:pPr>
+            <a:endParaRPr lang="en-US" sz="2400" b="0" dirty="0"/>
+          </a:p>
+          <a:p>
+            <a:pPr marL="342900" indent="-342900">
+              <a:buFont typeface="+mj-lt"/>
+              <a:buAutoNum type="arabicPeriod"/>
+            </a:pPr>
+            <a:endParaRPr lang="en-US" sz="2400" b="0" dirty="0">
+              <a:solidFill>
+                <a:schemeClr val="tx1"/>
+              </a:solidFill>
+            </a:endParaRPr>
+          </a:p>
+          <a:p>
+            <a:pPr marL="342900" indent="-342900">
+              <a:buFont typeface="+mj-lt"/>
+              <a:buAutoNum type="arabicPeriod"/>
+            </a:pPr>
+            <a:endParaRPr lang="en-US" sz="2400" b="0" dirty="0">
+              <a:solidFill>
+                <a:schemeClr val="tx1"/>
+              </a:solidFill>
+            </a:endParaRPr>
+          </a:p>
+        </p:txBody>
+      </p:sp>
+      <p:sp>
+        <p:nvSpPr>
+          <p:cNvPr id="8" name="Slide Number Placeholder 7">
+            <a:extLst>
+              <a:ext uri="{FF2B5EF4-FFF2-40B4-BE49-F238E27FC236}">
+                <a16:creationId xmlns:a16="http://schemas.microsoft.com/office/drawing/2014/main" id="{76C5416C-9739-2F46-98DD-0F89AF48D533}"/>
+              </a:ext>
+            </a:extLst>
+          </p:cNvPr>
+          <p:cNvSpPr>
+            <a:spLocks noGrp="1"/>
+          </p:cNvSpPr>
+          <p:nvPr>
+            <p:ph type="sldNum" sz="quarter" idx="10"/>
+          </p:nvPr>
+        </p:nvSpPr>
+        <p:spPr/>
+        <p:txBody>
+          <a:bodyPr/>
+          <a:lstStyle/>
+          <a:p>
+            <a:fld id="{7C6B53F1-911B-F745-BD66-11EC17F59F6C}" type="slidenum">
+              <a:rPr lang="en-US" smtClean="0"/>
+              <a:t>8</a:t>
+            </a:fld>
+            <a:endParaRPr lang="en-US"/>
+          </a:p>
+        </p:txBody>
+      </p:sp>
+      <p:sp>
+        <p:nvSpPr>
+          <p:cNvPr id="5" name="TextBox 4">
+            <a:extLst>
+              <a:ext uri="{FF2B5EF4-FFF2-40B4-BE49-F238E27FC236}">
+                <a16:creationId xmlns:a16="http://schemas.microsoft.com/office/drawing/2014/main" id="{C899410A-2CA5-3748-84F0-0DBA652E49DA}"/>
+              </a:ext>
+            </a:extLst>
+          </p:cNvPr>
+          <p:cNvSpPr txBox="1"/>
+          <p:nvPr/>
+        </p:nvSpPr>
+        <p:spPr>
+          <a:xfrm>
+            <a:off x="1324885" y="111328"/>
+            <a:ext cx="6494229" cy="461665"/>
+          </a:xfrm>
+          <a:prstGeom prst="rect">
+            <a:avLst/>
+          </a:prstGeom>
+          <a:noFill/>
+        </p:spPr>
+        <p:txBody>
+          <a:bodyPr wrap="square" rtlCol="0">
+            <a:spAutoFit/>
+          </a:bodyPr>
+          <a:lstStyle/>
+          <a:p>
+            <a:pPr algn="ctr"/>
+            <a:r>
+              <a:rPr lang="en-US" sz="2400" b="1" dirty="0">
+                <a:solidFill>
+                  <a:schemeClr val="bg1"/>
+                </a:solidFill>
+              </a:rPr>
+              <a:t>Summary </a:t>
+            </a:r>
+          </a:p>
+        </p:txBody>
+      </p:sp>
+      <p:sp>
+        <p:nvSpPr>
+          <p:cNvPr id="17" name="TextBox 16">
+            <a:extLst>
+              <a:ext uri="{FF2B5EF4-FFF2-40B4-BE49-F238E27FC236}">
+                <a16:creationId xmlns:a16="http://schemas.microsoft.com/office/drawing/2014/main" id="{1DB0AF42-815D-6B43-ADE8-DBB1845F1B2D}"/>
+              </a:ext>
+            </a:extLst>
+          </p:cNvPr>
+          <p:cNvSpPr txBox="1"/>
+          <p:nvPr/>
+        </p:nvSpPr>
+        <p:spPr>
+          <a:xfrm>
+            <a:off x="418367" y="1430724"/>
+            <a:ext cx="8307264" cy="2677656"/>
+          </a:xfrm>
+          <a:prstGeom prst="rect">
+            <a:avLst/>
+          </a:prstGeom>
+          <a:noFill/>
+        </p:spPr>
+        <p:txBody>
+          <a:bodyPr wrap="square" rtlCol="0">
+            <a:spAutoFit/>
+          </a:bodyPr>
+          <a:lstStyle/>
+          <a:p>
+            <a:pPr marL="342900" indent="-342900">
+              <a:buFont typeface="Arial" panose="020B0604020202020204" pitchFamily="34" charset="0"/>
+              <a:buChar char="•"/>
+            </a:pPr>
+            <a:r>
+              <a:rPr lang="en-US" sz="2400" dirty="0"/>
+              <a:t>This is a very simple thing to do in theory!</a:t>
+            </a:r>
+          </a:p>
+          <a:p>
+            <a:pPr marL="342900" indent="-342900">
+              <a:buFont typeface="Arial" panose="020B0604020202020204" pitchFamily="34" charset="0"/>
+              <a:buChar char="•"/>
+            </a:pPr>
+            <a:endParaRPr lang="en-US" sz="2400" dirty="0"/>
+          </a:p>
+          <a:p>
+            <a:pPr marL="342900" indent="-342900">
+              <a:buFont typeface="Arial" panose="020B0604020202020204" pitchFamily="34" charset="0"/>
+              <a:buChar char="•"/>
+            </a:pPr>
+            <a:r>
+              <a:rPr lang="en-US" sz="2400" dirty="0"/>
+              <a:t>I’ve been spending a lot of time going back and forth with cuts:</a:t>
+            </a:r>
+          </a:p>
+          <a:p>
+            <a:pPr marL="342900" indent="-342900">
+              <a:buFont typeface="Arial" panose="020B0604020202020204" pitchFamily="34" charset="0"/>
+              <a:buChar char="•"/>
+            </a:pPr>
+            <a:endParaRPr lang="en-US" sz="2400" dirty="0"/>
+          </a:p>
+          <a:p>
+            <a:pPr marL="800100" lvl="1" indent="-342900">
+              <a:buFont typeface="Arial" panose="020B0604020202020204" pitchFamily="34" charset="0"/>
+              <a:buChar char="•"/>
+            </a:pPr>
+            <a:r>
+              <a:rPr lang="en-US" sz="2400" dirty="0"/>
+              <a:t>I want to retain as many crystals as possible</a:t>
+            </a:r>
+          </a:p>
+          <a:p>
+            <a:pPr marL="800100" lvl="1" indent="-342900">
+              <a:buFont typeface="Arial" panose="020B0604020202020204" pitchFamily="34" charset="0"/>
+              <a:buChar char="•"/>
+            </a:pPr>
+            <a:endParaRPr lang="en-US" sz="2400" dirty="0"/>
+          </a:p>
+          <a:p>
+            <a:pPr marL="800100" lvl="1" indent="-342900">
+              <a:buFont typeface="Arial" panose="020B0604020202020204" pitchFamily="34" charset="0"/>
+              <a:buChar char="•"/>
+            </a:pPr>
+            <a:r>
+              <a:rPr lang="en-US" sz="2400" dirty="0"/>
+              <a:t>I want cuts to be well motivated</a:t>
+            </a:r>
+          </a:p>
+        </p:txBody>
+      </p:sp>
+    </p:spTree>
+    <p:extLst>
+      <p:ext uri="{BB962C8B-B14F-4D97-AF65-F5344CB8AC3E}">
+        <p14:creationId xmlns:p14="http://schemas.microsoft.com/office/powerpoint/2010/main" val="1580880300"/>
       </p:ext>
     </p:extLst>
   </p:cSld>

</xml_diff>